<commit_message>
3 i 4 predavanje
</commit_message>
<xml_diff>
--- a/01 Predavanje/RSII -Lesson 01.pptx
+++ b/01 Predavanje/RSII -Lesson 01.pptx
@@ -5,7 +5,7 @@
     <p:sldMasterId id="2147483648" r:id="rId1"/>
   </p:sldMasterIdLst>
   <p:notesMasterIdLst>
-    <p:notesMasterId r:id="rId25"/>
+    <p:notesMasterId r:id="rId26"/>
   </p:notesMasterIdLst>
   <p:sldIdLst>
     <p:sldId id="256" r:id="rId2"/>
@@ -15,22 +15,23 @@
     <p:sldId id="258" r:id="rId6"/>
     <p:sldId id="259" r:id="rId7"/>
     <p:sldId id="260" r:id="rId8"/>
-    <p:sldId id="284" r:id="rId9"/>
-    <p:sldId id="261" r:id="rId10"/>
-    <p:sldId id="262" r:id="rId11"/>
-    <p:sldId id="289" r:id="rId12"/>
-    <p:sldId id="263" r:id="rId13"/>
+    <p:sldId id="291" r:id="rId9"/>
+    <p:sldId id="284" r:id="rId10"/>
+    <p:sldId id="261" r:id="rId11"/>
+    <p:sldId id="262" r:id="rId12"/>
+    <p:sldId id="289" r:id="rId13"/>
     <p:sldId id="264" r:id="rId14"/>
-    <p:sldId id="265" r:id="rId15"/>
-    <p:sldId id="281" r:id="rId16"/>
-    <p:sldId id="266" r:id="rId17"/>
-    <p:sldId id="267" r:id="rId18"/>
-    <p:sldId id="278" r:id="rId19"/>
-    <p:sldId id="279" r:id="rId20"/>
-    <p:sldId id="282" r:id="rId21"/>
-    <p:sldId id="268" r:id="rId22"/>
-    <p:sldId id="290" r:id="rId23"/>
-    <p:sldId id="283" r:id="rId24"/>
+    <p:sldId id="263" r:id="rId15"/>
+    <p:sldId id="265" r:id="rId16"/>
+    <p:sldId id="281" r:id="rId17"/>
+    <p:sldId id="266" r:id="rId18"/>
+    <p:sldId id="267" r:id="rId19"/>
+    <p:sldId id="278" r:id="rId20"/>
+    <p:sldId id="279" r:id="rId21"/>
+    <p:sldId id="282" r:id="rId22"/>
+    <p:sldId id="268" r:id="rId23"/>
+    <p:sldId id="290" r:id="rId24"/>
+    <p:sldId id="283" r:id="rId25"/>
   </p:sldIdLst>
   <p:sldSz cx="12192000" cy="6858000"/>
   <p:notesSz cx="6858000" cy="9144000"/>
@@ -227,7 +228,7 @@
           <a:p>
             <a:fld id="{29FC8E6B-016B-4F00-90A8-6234AA4B38C2}" type="datetimeFigureOut">
               <a:rPr lang="en-US" smtClean="0"/>
-              <a:t>3/12/2019</a:t>
+              <a:t>3/15/2019</a:t>
             </a:fld>
             <a:endParaRPr lang="en-US"/>
           </a:p>
@@ -596,7 +597,7 @@
           <a:p>
             <a:fld id="{6836151D-8E10-441D-ACAB-C0A69E248B8E}" type="slidenum">
               <a:rPr lang="en-US" smtClean="0"/>
-              <a:t>9</a:t>
+              <a:t>10</a:t>
             </a:fld>
             <a:endParaRPr lang="en-US"/>
           </a:p>
@@ -606,6 +607,150 @@
     <p:extLst>
       <p:ext uri="{BB962C8B-B14F-4D97-AF65-F5344CB8AC3E}">
         <p14:creationId xmlns:p14="http://schemas.microsoft.com/office/powerpoint/2010/main" val="2542672077"/>
+      </p:ext>
+    </p:extLst>
+  </p:cSld>
+  <p:clrMapOvr>
+    <a:masterClrMapping/>
+  </p:clrMapOvr>
+</p:notes>
+</file>
+
+<file path=ppt/notesSlides/notesSlide10.xml><?xml version="1.0" encoding="utf-8"?>
+<p:notes xmlns:a="http://schemas.openxmlformats.org/drawingml/2006/main" xmlns:r="http://schemas.openxmlformats.org/officeDocument/2006/relationships" xmlns:p="http://schemas.openxmlformats.org/presentationml/2006/main">
+  <p:cSld>
+    <p:spTree>
+      <p:nvGrpSpPr>
+        <p:cNvPr id="1" name=""/>
+        <p:cNvGrpSpPr/>
+        <p:nvPr/>
+      </p:nvGrpSpPr>
+      <p:grpSpPr>
+        <a:xfrm>
+          <a:off x="0" y="0"/>
+          <a:ext cx="0" cy="0"/>
+          <a:chOff x="0" y="0"/>
+          <a:chExt cx="0" cy="0"/>
+        </a:xfrm>
+      </p:grpSpPr>
+      <p:sp>
+        <p:nvSpPr>
+          <p:cNvPr id="2" name="Slide Image Placeholder 1"/>
+          <p:cNvSpPr>
+            <a:spLocks noGrp="1" noRot="1" noChangeAspect="1"/>
+          </p:cNvSpPr>
+          <p:nvPr>
+            <p:ph type="sldImg"/>
+          </p:nvPr>
+        </p:nvSpPr>
+        <p:spPr/>
+      </p:sp>
+      <p:sp>
+        <p:nvSpPr>
+          <p:cNvPr id="3" name="Notes Placeholder 2"/>
+          <p:cNvSpPr>
+            <a:spLocks noGrp="1"/>
+          </p:cNvSpPr>
+          <p:nvPr>
+            <p:ph type="body" idx="1"/>
+          </p:nvPr>
+        </p:nvSpPr>
+        <p:spPr/>
+        <p:txBody>
+          <a:bodyPr/>
+          <a:lstStyle/>
+          <a:p>
+            <a:r>
+              <a:rPr lang="bs-Latn-BA" dirty="0"/>
+              <a:t>Pri razvoju SOAP Servisa, </a:t>
+            </a:r>
+            <a:r>
+              <a:rPr lang="bs-Latn-BA" dirty="0" err="1"/>
+              <a:t>developer</a:t>
+            </a:r>
+            <a:r>
+              <a:rPr lang="bs-Latn-BA" dirty="0"/>
+              <a:t> ne upravlja direktno sa XML porukama, nego razvojnom okolinom koja se sastoji od </a:t>
+            </a:r>
+            <a:r>
+              <a:rPr lang="bs-Latn-BA" dirty="0" err="1"/>
+              <a:t>preogramskog</a:t>
+            </a:r>
+            <a:r>
+              <a:rPr lang="bs-Latn-BA" dirty="0"/>
+              <a:t> jezika i skupa alata za razvoj servisa. Formatiranje i </a:t>
+            </a:r>
+            <a:r>
+              <a:rPr lang="bs-Latn-BA" dirty="0" err="1"/>
+              <a:t>enkodiranje</a:t>
+            </a:r>
+            <a:r>
+              <a:rPr lang="bs-Latn-BA" dirty="0"/>
+              <a:t> XML poruka radi se automatski sto uveliko </a:t>
+            </a:r>
+            <a:r>
+              <a:rPr lang="bs-Latn-BA" dirty="0" err="1"/>
+              <a:t>olakšava</a:t>
+            </a:r>
+            <a:r>
+              <a:rPr lang="bs-Latn-BA" dirty="0"/>
+              <a:t> razvoja SOA baziranih rješenja. </a:t>
+            </a:r>
+            <a:r>
+              <a:rPr lang="bs-Latn-BA" dirty="0" err="1"/>
+              <a:t>Prikmjer</a:t>
+            </a:r>
+            <a:r>
+              <a:rPr lang="bs-Latn-BA" dirty="0"/>
+              <a:t> pokazuje sta to </a:t>
+            </a:r>
+            <a:r>
+              <a:rPr lang="bs-Latn-BA" dirty="0" err="1"/>
+              <a:t>developer</a:t>
+            </a:r>
+            <a:r>
+              <a:rPr lang="bs-Latn-BA" dirty="0"/>
+              <a:t> treba da uradi da bi se definisala jedna </a:t>
+            </a:r>
+            <a:r>
+              <a:rPr lang="bs-Latn-BA" dirty="0" err="1"/>
+              <a:t>pruka</a:t>
+            </a:r>
+            <a:r>
+              <a:rPr lang="bs-Latn-BA" dirty="0"/>
+              <a:t>.</a:t>
+            </a:r>
+            <a:endParaRPr lang="en-US" dirty="0"/>
+          </a:p>
+        </p:txBody>
+      </p:sp>
+      <p:sp>
+        <p:nvSpPr>
+          <p:cNvPr id="4" name="Slide Number Placeholder 3"/>
+          <p:cNvSpPr>
+            <a:spLocks noGrp="1"/>
+          </p:cNvSpPr>
+          <p:nvPr>
+            <p:ph type="sldNum" sz="quarter" idx="5"/>
+          </p:nvPr>
+        </p:nvSpPr>
+        <p:spPr/>
+        <p:txBody>
+          <a:bodyPr/>
+          <a:lstStyle/>
+          <a:p>
+            <a:fld id="{6836151D-8E10-441D-ACAB-C0A69E248B8E}" type="slidenum">
+              <a:rPr lang="en-US" smtClean="0"/>
+              <a:t>22</a:t>
+            </a:fld>
+            <a:endParaRPr lang="en-US"/>
+          </a:p>
+        </p:txBody>
+      </p:sp>
+    </p:spTree>
+    <p:extLst>
+      <p:ext uri="{BB962C8B-B14F-4D97-AF65-F5344CB8AC3E}">
+        <p14:creationId xmlns:p14="http://schemas.microsoft.com/office/powerpoint/2010/main" val="172284743"/>
       </p:ext>
     </p:extLst>
   </p:cSld>
@@ -661,15 +806,15 @@
           <a:p>
             <a:r>
               <a:rPr lang="bs-Latn-BA" dirty="0"/>
-              <a:t>XML jezik se javio kao potreba neovisnosti web servisa o tehnologiji, softveru ili hardveru u </a:t>
+              <a:t>SOAP Servisi predstavljaju dinamički modularne distribuirane </a:t>
             </a:r>
             <a:r>
               <a:rPr lang="bs-Latn-BA" dirty="0" err="1"/>
-              <a:t>savremenom</a:t>
-            </a:r>
-            <a:r>
-              <a:rPr lang="bs-Latn-BA" dirty="0"/>
-              <a:t> poslovanju i razmjeni podataka </a:t>
+              <a:t>aplikcaije</a:t>
+            </a:r>
+            <a:r>
+              <a:rPr lang="bs-Latn-BA" dirty="0"/>
+              <a:t> za razmjenu informacija </a:t>
             </a:r>
             <a:r>
               <a:rPr lang="bs-Latn-BA" dirty="0" err="1"/>
@@ -677,49 +822,15 @@
             </a:r>
             <a:r>
               <a:rPr lang="bs-Latn-BA" dirty="0"/>
-              <a:t> kompanija, korisnika i javnih kompanija</a:t>
-            </a:r>
-          </a:p>
-          <a:p>
-            <a:endParaRPr lang="bs-Latn-BA" dirty="0"/>
-          </a:p>
-          <a:p>
-            <a:r>
-              <a:rPr lang="bs-Latn-BA" dirty="0"/>
-              <a:t>XML web servisi, sličan HTML zbog </a:t>
+              <a:t> udaljenih tačaka. To XML bazirani sistemi za razmjenu podataka, a koriste direktnu komunikaciju te ponovnu iskoristivost i </a:t>
             </a:r>
             <a:r>
               <a:rPr lang="bs-Latn-BA" dirty="0" err="1"/>
-              <a:t>tagova</a:t>
-            </a:r>
-            <a:r>
-              <a:rPr lang="bs-Latn-BA" dirty="0"/>
-              <a:t>. Osnovna razlika jeste da XML ne posjeduje predefinisane </a:t>
-            </a:r>
-            <a:r>
-              <a:rPr lang="bs-Latn-BA" dirty="0" err="1"/>
-              <a:t>tagove</a:t>
-            </a:r>
-            <a:r>
-              <a:rPr lang="bs-Latn-BA" dirty="0"/>
-              <a:t>, </a:t>
-            </a:r>
-            <a:r>
-              <a:rPr lang="bs-Latn-BA" dirty="0" err="1"/>
-              <a:t>štp</a:t>
-            </a:r>
-            <a:r>
-              <a:rPr lang="bs-Latn-BA" dirty="0"/>
-              <a:t> nije slučaj za HTML.</a:t>
-            </a:r>
-          </a:p>
-          <a:p>
-            <a:endParaRPr lang="bs-Latn-BA" dirty="0"/>
-          </a:p>
-          <a:p>
-            <a:r>
-              <a:rPr lang="bs-Latn-BA" dirty="0"/>
-              <a:t>Objekat Student  opisan  u XML, a osobine objekta čine atributi.</a:t>
+              <a:t>interoperabilnost</a:t>
+            </a:r>
+            <a:r>
+              <a:rPr lang="bs-Latn-BA" dirty="0"/>
+              <a:t>.</a:t>
             </a:r>
             <a:endParaRPr lang="en-US" dirty="0"/>
           </a:p>
@@ -742,7 +853,7 @@
           <a:p>
             <a:fld id="{6836151D-8E10-441D-ACAB-C0A69E248B8E}" type="slidenum">
               <a:rPr lang="en-US" smtClean="0"/>
-              <a:t>12</a:t>
+              <a:t>13</a:t>
             </a:fld>
             <a:endParaRPr lang="en-US"/>
           </a:p>
@@ -751,7 +862,7 @@
     </p:spTree>
     <p:extLst>
       <p:ext uri="{BB962C8B-B14F-4D97-AF65-F5344CB8AC3E}">
-        <p14:creationId xmlns:p14="http://schemas.microsoft.com/office/powerpoint/2010/main" val="4235006288"/>
+        <p14:creationId xmlns:p14="http://schemas.microsoft.com/office/powerpoint/2010/main" val="3866937082"/>
       </p:ext>
     </p:extLst>
   </p:cSld>
@@ -807,13 +918,80 @@
           <a:p>
             <a:r>
               <a:rPr lang="bs-Latn-BA" dirty="0"/>
-              <a:t>Kompanija registruje servis preko UDDI, univerzalni način za definisanje servisa, i popis metoda i ostale osobine servise. Sve se to radi u WSDL datoteci.</a:t>
-            </a:r>
-          </a:p>
-          <a:p>
-            <a:r>
-              <a:rPr lang="bs-Latn-BA" dirty="0"/>
-              <a:t>Interakcije se mogu razmjenjivati preko SOAP poruka.</a:t>
+              <a:t>Kada govorimo o SOAP Servisima, uvijek vežemo XML jezik za njega jer XML je osnovna osobina SOAP Servisa.</a:t>
+            </a:r>
+          </a:p>
+          <a:p>
+            <a:r>
+              <a:rPr lang="bs-Latn-BA" dirty="0"/>
+              <a:t>SOAP servisi bazirani su na XML jeziku, koji je definisan na način da je neovisan o samim učesnicima razmjene podataka.</a:t>
+            </a:r>
+          </a:p>
+          <a:p>
+            <a:endParaRPr lang="bs-Latn-BA" dirty="0"/>
+          </a:p>
+          <a:p>
+            <a:r>
+              <a:rPr lang="bs-Latn-BA" dirty="0"/>
+              <a:t>Prvenstveno XML jezik se javio kao potreba neovisnosti web servisa o tehnologiji, softveru ili hardveru u </a:t>
+            </a:r>
+            <a:r>
+              <a:rPr lang="bs-Latn-BA" dirty="0" err="1"/>
+              <a:t>savremenom</a:t>
+            </a:r>
+            <a:r>
+              <a:rPr lang="bs-Latn-BA" dirty="0"/>
+              <a:t> poslovanju i razmjeni podataka </a:t>
+            </a:r>
+            <a:r>
+              <a:rPr lang="bs-Latn-BA" dirty="0" err="1"/>
+              <a:t>izmedju</a:t>
+            </a:r>
+            <a:r>
+              <a:rPr lang="bs-Latn-BA" dirty="0"/>
+              <a:t> kompanija, korisnika i javnih kompanija</a:t>
+            </a:r>
+          </a:p>
+          <a:p>
+            <a:endParaRPr lang="bs-Latn-BA" dirty="0"/>
+          </a:p>
+          <a:p>
+            <a:r>
+              <a:rPr lang="bs-Latn-BA" dirty="0"/>
+              <a:t>XML web servisi, sličan HTML zbog </a:t>
+            </a:r>
+            <a:r>
+              <a:rPr lang="bs-Latn-BA" dirty="0" err="1"/>
+              <a:t>tagova</a:t>
+            </a:r>
+            <a:r>
+              <a:rPr lang="bs-Latn-BA" dirty="0"/>
+              <a:t>, a osnovna razlika jeste da XML ne posjeduje predefinisane </a:t>
+            </a:r>
+            <a:r>
+              <a:rPr lang="bs-Latn-BA" dirty="0" err="1"/>
+              <a:t>tagove</a:t>
+            </a:r>
+            <a:r>
+              <a:rPr lang="bs-Latn-BA" dirty="0"/>
+              <a:t>, </a:t>
+            </a:r>
+            <a:r>
+              <a:rPr lang="bs-Latn-BA" dirty="0" err="1"/>
+              <a:t>štop</a:t>
+            </a:r>
+            <a:r>
+              <a:rPr lang="bs-Latn-BA" dirty="0"/>
+              <a:t> nije slučaj za HTML.</a:t>
+            </a:r>
+          </a:p>
+          <a:p>
+            <a:endParaRPr lang="bs-Latn-BA" dirty="0"/>
+          </a:p>
+          <a:p>
+            <a:r>
+              <a:rPr lang="bs-Latn-BA" dirty="0"/>
+              <a:t>Na ovom primjeru imamo prikazan objekat Student napisan XML jeziku a koji se može prenositi između servera i klijenta preko SOAP Servisa. Osnovna osobina XML jeste osobine objekta čine atributi.</a:t>
             </a:r>
             <a:endParaRPr lang="en-US" dirty="0"/>
           </a:p>
@@ -836,7 +1014,7 @@
           <a:p>
             <a:fld id="{6836151D-8E10-441D-ACAB-C0A69E248B8E}" type="slidenum">
               <a:rPr lang="en-US" smtClean="0"/>
-              <a:t>16</a:t>
+              <a:t>14</a:t>
             </a:fld>
             <a:endParaRPr lang="en-US"/>
           </a:p>
@@ -845,7 +1023,7 @@
     </p:spTree>
     <p:extLst>
       <p:ext uri="{BB962C8B-B14F-4D97-AF65-F5344CB8AC3E}">
-        <p14:creationId xmlns:p14="http://schemas.microsoft.com/office/powerpoint/2010/main" val="912587688"/>
+        <p14:creationId xmlns:p14="http://schemas.microsoft.com/office/powerpoint/2010/main" val="4235006288"/>
       </p:ext>
     </p:extLst>
   </p:cSld>
@@ -899,69 +1077,34 @@
           <a:bodyPr/>
           <a:lstStyle/>
           <a:p>
-            <a:pPr marL="0" marR="0" lvl="0" indent="0" algn="l" defTabSz="914400" rtl="0" eaLnBrk="1" fontAlgn="auto" latinLnBrk="0" hangingPunct="1">
-              <a:lnSpc>
-                <a:spcPct val="100000"/>
-              </a:lnSpc>
-              <a:spcBef>
-                <a:spcPts val="0"/>
-              </a:spcBef>
-              <a:spcAft>
-                <a:spcPts val="0"/>
-              </a:spcAft>
-              <a:buClrTx/>
-              <a:buSzTx/>
-              <a:buFontTx/>
-              <a:buNone/>
-              <a:tabLst/>
-              <a:defRPr/>
-            </a:pPr>
-            <a:r>
-              <a:rPr lang="en-US" b="0" dirty="0"/>
-              <a:t>SOAP – Envelope</a:t>
-            </a:r>
-            <a:r>
-              <a:rPr lang="bs-Latn-BA" b="0" dirty="0"/>
-              <a:t> –predstavlja indikator koji se koristi u </a:t>
-            </a:r>
-            <a:r>
-              <a:rPr lang="bs-Latn-BA" b="0" dirty="0" err="1"/>
-              <a:t>XMLu</a:t>
-            </a:r>
-            <a:r>
-              <a:rPr lang="bs-Latn-BA" b="0" dirty="0"/>
-              <a:t> da se označi </a:t>
-            </a:r>
-            <a:r>
-              <a:rPr lang="bs-Latn-BA" b="0" dirty="0" err="1"/>
-              <a:t>početak</a:t>
-            </a:r>
-            <a:r>
-              <a:rPr lang="bs-Latn-BA" b="0" dirty="0"/>
-              <a:t> i kraj podatka za razmjenu. Posmatra se kao mehanizam za pakiranje poruka u SOAP web servisu.</a:t>
-            </a:r>
-          </a:p>
-          <a:p>
-            <a:pPr marL="0" marR="0" lvl="0" indent="0" algn="l" defTabSz="914400" rtl="0" eaLnBrk="1" fontAlgn="auto" latinLnBrk="0" hangingPunct="1">
-              <a:lnSpc>
-                <a:spcPct val="100000"/>
-              </a:lnSpc>
-              <a:spcBef>
-                <a:spcPts val="0"/>
-              </a:spcBef>
-              <a:spcAft>
-                <a:spcPts val="0"/>
-              </a:spcAft>
-              <a:buClrTx/>
-              <a:buSzTx/>
-              <a:buFontTx/>
-              <a:buNone/>
-              <a:tabLst/>
-              <a:defRPr/>
-            </a:pPr>
-            <a:endParaRPr lang="en-US" b="0" dirty="0"/>
-          </a:p>
-          <a:p>
+            <a:r>
+              <a:rPr lang="bs-Latn-BA" dirty="0"/>
+              <a:t>Kod SOAP Servisa razlikujemo 4 osnovne komponente: </a:t>
+            </a:r>
+          </a:p>
+          <a:p>
+            <a:r>
+              <a:rPr lang="bs-Latn-BA" dirty="0"/>
+              <a:t>XML – jezik kojeg koristimo u razmjeni podataka</a:t>
+            </a:r>
+          </a:p>
+          <a:p>
+            <a:r>
+              <a:rPr lang="bs-Latn-BA" dirty="0"/>
+              <a:t>SOAP – protokol odnosno skup pravila koje koristimo priliko komunikacije</a:t>
+            </a:r>
+          </a:p>
+          <a:p>
+            <a:r>
+              <a:rPr lang="bs-Latn-BA" dirty="0"/>
+              <a:t>UDDI – jedinstveni način prikaza i opisa servisa, te načina pristupanja i integracije.</a:t>
+            </a:r>
+          </a:p>
+          <a:p>
+            <a:r>
+              <a:rPr lang="bs-Latn-BA" dirty="0"/>
+              <a:t>WSDL – skup procedura za opisivanje servisa i njegovih operacija. </a:t>
+            </a:r>
             <a:endParaRPr lang="en-US" dirty="0"/>
           </a:p>
         </p:txBody>
@@ -983,7 +1126,7 @@
           <a:p>
             <a:fld id="{6836151D-8E10-441D-ACAB-C0A69E248B8E}" type="slidenum">
               <a:rPr lang="en-US" smtClean="0"/>
-              <a:t>17</a:t>
+              <a:t>15</a:t>
             </a:fld>
             <a:endParaRPr lang="en-US"/>
           </a:p>
@@ -992,7 +1135,7 @@
     </p:spTree>
     <p:extLst>
       <p:ext uri="{BB962C8B-B14F-4D97-AF65-F5344CB8AC3E}">
-        <p14:creationId xmlns:p14="http://schemas.microsoft.com/office/powerpoint/2010/main" val="1704271954"/>
+        <p14:creationId xmlns:p14="http://schemas.microsoft.com/office/powerpoint/2010/main" val="2006718351"/>
       </p:ext>
     </p:extLst>
   </p:cSld>
@@ -1046,6 +1189,301 @@
           <a:bodyPr/>
           <a:lstStyle/>
           <a:p>
+            <a:endParaRPr lang="en-US" dirty="0"/>
+          </a:p>
+        </p:txBody>
+      </p:sp>
+      <p:sp>
+        <p:nvSpPr>
+          <p:cNvPr id="4" name="Slide Number Placeholder 3"/>
+          <p:cNvSpPr>
+            <a:spLocks noGrp="1"/>
+          </p:cNvSpPr>
+          <p:nvPr>
+            <p:ph type="sldNum" sz="quarter" idx="5"/>
+          </p:nvPr>
+        </p:nvSpPr>
+        <p:spPr/>
+        <p:txBody>
+          <a:bodyPr/>
+          <a:lstStyle/>
+          <a:p>
+            <a:fld id="{6836151D-8E10-441D-ACAB-C0A69E248B8E}" type="slidenum">
+              <a:rPr lang="en-US" smtClean="0"/>
+              <a:t>16</a:t>
+            </a:fld>
+            <a:endParaRPr lang="en-US"/>
+          </a:p>
+        </p:txBody>
+      </p:sp>
+    </p:spTree>
+    <p:extLst>
+      <p:ext uri="{BB962C8B-B14F-4D97-AF65-F5344CB8AC3E}">
+        <p14:creationId xmlns:p14="http://schemas.microsoft.com/office/powerpoint/2010/main" val="1228709768"/>
+      </p:ext>
+    </p:extLst>
+  </p:cSld>
+  <p:clrMapOvr>
+    <a:masterClrMapping/>
+  </p:clrMapOvr>
+</p:notes>
+</file>
+
+<file path=ppt/notesSlides/notesSlide6.xml><?xml version="1.0" encoding="utf-8"?>
+<p:notes xmlns:a="http://schemas.openxmlformats.org/drawingml/2006/main" xmlns:r="http://schemas.openxmlformats.org/officeDocument/2006/relationships" xmlns:p="http://schemas.openxmlformats.org/presentationml/2006/main">
+  <p:cSld>
+    <p:spTree>
+      <p:nvGrpSpPr>
+        <p:cNvPr id="1" name=""/>
+        <p:cNvGrpSpPr/>
+        <p:nvPr/>
+      </p:nvGrpSpPr>
+      <p:grpSpPr>
+        <a:xfrm>
+          <a:off x="0" y="0"/>
+          <a:ext cx="0" cy="0"/>
+          <a:chOff x="0" y="0"/>
+          <a:chExt cx="0" cy="0"/>
+        </a:xfrm>
+      </p:grpSpPr>
+      <p:sp>
+        <p:nvSpPr>
+          <p:cNvPr id="2" name="Slide Image Placeholder 1"/>
+          <p:cNvSpPr>
+            <a:spLocks noGrp="1" noRot="1" noChangeAspect="1"/>
+          </p:cNvSpPr>
+          <p:nvPr>
+            <p:ph type="sldImg"/>
+          </p:nvPr>
+        </p:nvSpPr>
+        <p:spPr/>
+      </p:sp>
+      <p:sp>
+        <p:nvSpPr>
+          <p:cNvPr id="3" name="Notes Placeholder 2"/>
+          <p:cNvSpPr>
+            <a:spLocks noGrp="1"/>
+          </p:cNvSpPr>
+          <p:nvPr>
+            <p:ph type="body" idx="1"/>
+          </p:nvPr>
+        </p:nvSpPr>
+        <p:spPr/>
+        <p:txBody>
+          <a:bodyPr/>
+          <a:lstStyle/>
+          <a:p>
+            <a:r>
+              <a:rPr lang="bs-Latn-BA" dirty="0"/>
+              <a:t>Ako pogledamo cjelokupnu sliku razvoja, registracije i načina korištenja servisa možemo jednostavno opisati sa prikazanom šemom. </a:t>
+            </a:r>
+          </a:p>
+          <a:p>
+            <a:r>
+              <a:rPr lang="bs-Latn-BA" dirty="0"/>
+              <a:t>Kompanija registruje servis preko UDDI, univerzalni način za definisanje servisa, i popis metoda i ostale osobine servise. Sve se to radi u WSDL datoteci.</a:t>
+            </a:r>
+          </a:p>
+          <a:p>
+            <a:r>
+              <a:rPr lang="bs-Latn-BA" dirty="0"/>
+              <a:t>Interakcije se mogu razmjenjivati preko SOAP poruka. Registracija SOAP servisa vršimo preko UDDI pri čemu definišemo lokaciju, odnosno pristupnu tačku. Informacije vezano za servis definišemo u WSDL datoteci koja sadrži sve neophodne informacije o korištenju, sigurnost, i dostupnim operacijama servisa. </a:t>
+            </a:r>
+          </a:p>
+          <a:p>
+            <a:endParaRPr lang="bs-Latn-BA" dirty="0"/>
+          </a:p>
+          <a:p>
+            <a:r>
+              <a:rPr lang="bs-Latn-BA" dirty="0"/>
+              <a:t>Klijent kada registruje servis, informacije o registraciji i načinu korištenja servisa dobija preko WSDL datoteke. Svaki klijent koji pristupa servisu mora dobiti najmanje 3 informacije koje se zovu ABC informacije. A – kao adresu servisa, B – kao </a:t>
+            </a:r>
+            <a:r>
+              <a:rPr lang="bs-Latn-BA" dirty="0" err="1"/>
+              <a:t>binding</a:t>
+            </a:r>
+            <a:r>
+              <a:rPr lang="bs-Latn-BA" dirty="0"/>
+              <a:t> odnosno način na koji se servis koristi, te C </a:t>
+            </a:r>
+            <a:r>
+              <a:rPr lang="bs-Latn-BA" dirty="0" err="1"/>
+              <a:t>contract</a:t>
+            </a:r>
+            <a:r>
+              <a:rPr lang="bs-Latn-BA" dirty="0"/>
+              <a:t> „ugovor“ skup pravila pri </a:t>
+            </a:r>
+            <a:r>
+              <a:rPr lang="bs-Latn-BA" dirty="0" err="1"/>
+              <a:t>koristenju</a:t>
+            </a:r>
+            <a:r>
+              <a:rPr lang="bs-Latn-BA" dirty="0"/>
+              <a:t> servisa. Jednom kada se uspostavi vezan, tada komunikacija </a:t>
+            </a:r>
+            <a:r>
+              <a:rPr lang="bs-Latn-BA" dirty="0" err="1"/>
+              <a:t>izmedju</a:t>
+            </a:r>
+            <a:r>
+              <a:rPr lang="bs-Latn-BA" dirty="0"/>
+              <a:t> klijenta i Servera odvija se na principu „</a:t>
+            </a:r>
+            <a:r>
+              <a:rPr lang="bs-Latn-BA" dirty="0" err="1"/>
+              <a:t>Request-Response</a:t>
+            </a:r>
+            <a:r>
+              <a:rPr lang="bs-Latn-BA" dirty="0"/>
+              <a:t>“.</a:t>
+            </a:r>
+            <a:endParaRPr lang="en-US" dirty="0"/>
+          </a:p>
+        </p:txBody>
+      </p:sp>
+      <p:sp>
+        <p:nvSpPr>
+          <p:cNvPr id="4" name="Slide Number Placeholder 3"/>
+          <p:cNvSpPr>
+            <a:spLocks noGrp="1"/>
+          </p:cNvSpPr>
+          <p:nvPr>
+            <p:ph type="sldNum" sz="quarter" idx="5"/>
+          </p:nvPr>
+        </p:nvSpPr>
+        <p:spPr/>
+        <p:txBody>
+          <a:bodyPr/>
+          <a:lstStyle/>
+          <a:p>
+            <a:fld id="{6836151D-8E10-441D-ACAB-C0A69E248B8E}" type="slidenum">
+              <a:rPr lang="en-US" smtClean="0"/>
+              <a:t>17</a:t>
+            </a:fld>
+            <a:endParaRPr lang="en-US"/>
+          </a:p>
+        </p:txBody>
+      </p:sp>
+    </p:spTree>
+    <p:extLst>
+      <p:ext uri="{BB962C8B-B14F-4D97-AF65-F5344CB8AC3E}">
+        <p14:creationId xmlns:p14="http://schemas.microsoft.com/office/powerpoint/2010/main" val="912587688"/>
+      </p:ext>
+    </p:extLst>
+  </p:cSld>
+  <p:clrMapOvr>
+    <a:masterClrMapping/>
+  </p:clrMapOvr>
+</p:notes>
+</file>
+
+<file path=ppt/notesSlides/notesSlide7.xml><?xml version="1.0" encoding="utf-8"?>
+<p:notes xmlns:a="http://schemas.openxmlformats.org/drawingml/2006/main" xmlns:r="http://schemas.openxmlformats.org/officeDocument/2006/relationships" xmlns:p="http://schemas.openxmlformats.org/presentationml/2006/main">
+  <p:cSld>
+    <p:spTree>
+      <p:nvGrpSpPr>
+        <p:cNvPr id="1" name=""/>
+        <p:cNvGrpSpPr/>
+        <p:nvPr/>
+      </p:nvGrpSpPr>
+      <p:grpSpPr>
+        <a:xfrm>
+          <a:off x="0" y="0"/>
+          <a:ext cx="0" cy="0"/>
+          <a:chOff x="0" y="0"/>
+          <a:chExt cx="0" cy="0"/>
+        </a:xfrm>
+      </p:grpSpPr>
+      <p:sp>
+        <p:nvSpPr>
+          <p:cNvPr id="2" name="Slide Image Placeholder 1"/>
+          <p:cNvSpPr>
+            <a:spLocks noGrp="1" noRot="1" noChangeAspect="1"/>
+          </p:cNvSpPr>
+          <p:nvPr>
+            <p:ph type="sldImg"/>
+          </p:nvPr>
+        </p:nvSpPr>
+        <p:spPr/>
+      </p:sp>
+      <p:sp>
+        <p:nvSpPr>
+          <p:cNvPr id="3" name="Notes Placeholder 2"/>
+          <p:cNvSpPr>
+            <a:spLocks noGrp="1"/>
+          </p:cNvSpPr>
+          <p:nvPr>
+            <p:ph type="body" idx="1"/>
+          </p:nvPr>
+        </p:nvSpPr>
+        <p:spPr/>
+        <p:txBody>
+          <a:bodyPr/>
+          <a:lstStyle/>
+          <a:p>
+            <a:pPr marL="0" marR="0" lvl="0" indent="0" algn="l" defTabSz="914400" rtl="0" eaLnBrk="1" fontAlgn="auto" latinLnBrk="0" hangingPunct="1">
+              <a:lnSpc>
+                <a:spcPct val="100000"/>
+              </a:lnSpc>
+              <a:spcBef>
+                <a:spcPts val="0"/>
+              </a:spcBef>
+              <a:spcAft>
+                <a:spcPts val="0"/>
+              </a:spcAft>
+              <a:buClrTx/>
+              <a:buSzTx/>
+              <a:buFontTx/>
+              <a:buNone/>
+              <a:tabLst/>
+              <a:defRPr/>
+            </a:pPr>
+            <a:r>
+              <a:rPr lang="bs-Latn-BA" b="0" dirty="0"/>
+              <a:t>Komunikacija </a:t>
+            </a:r>
+            <a:r>
+              <a:rPr lang="bs-Latn-BA" b="0" dirty="0" err="1"/>
+              <a:t>izmedju</a:t>
+            </a:r>
+            <a:r>
+              <a:rPr lang="bs-Latn-BA" b="0" dirty="0"/>
+              <a:t> klijenta i servera u kontekstu XML Servisa bazirana je na SOA protokolu. On predstavlja XML bazirani protokol za razmjenu podataka. Svaki SOA paket poslan od strane klijenta ili servera sadrži skup predefinisanih objekata:</a:t>
+            </a:r>
+          </a:p>
+          <a:p>
+            <a:pPr marL="0" marR="0" lvl="0" indent="0" algn="l" defTabSz="914400" rtl="0" eaLnBrk="1" fontAlgn="auto" latinLnBrk="0" hangingPunct="1">
+              <a:lnSpc>
+                <a:spcPct val="100000"/>
+              </a:lnSpc>
+              <a:spcBef>
+                <a:spcPts val="0"/>
+              </a:spcBef>
+              <a:spcAft>
+                <a:spcPts val="0"/>
+              </a:spcAft>
+              <a:buClrTx/>
+              <a:buSzTx/>
+              <a:buFontTx/>
+              <a:buNone/>
+              <a:tabLst/>
+              <a:defRPr/>
+            </a:pPr>
+            <a:r>
+              <a:rPr lang="bs-Latn-BA" b="0" dirty="0"/>
+              <a:t>Osnovni dio svakog paketa jeste objekat </a:t>
+            </a:r>
+            <a:r>
+              <a:rPr lang="bs-Latn-BA" b="0" dirty="0" err="1"/>
+              <a:t>Envelop</a:t>
+            </a:r>
+            <a:r>
+              <a:rPr lang="bs-Latn-BA" b="0" dirty="0"/>
+              <a:t>.</a:t>
+            </a:r>
+          </a:p>
+          <a:p>
             <a:pPr marL="0" marR="0" lvl="0" indent="0" algn="l" defTabSz="914400" rtl="0" eaLnBrk="1" fontAlgn="auto" latinLnBrk="0" hangingPunct="1">
               <a:lnSpc>
                 <a:spcPct val="100000"/>
@@ -1139,7 +1577,239 @@
     </p:spTree>
     <p:extLst>
       <p:ext uri="{BB962C8B-B14F-4D97-AF65-F5344CB8AC3E}">
+        <p14:creationId xmlns:p14="http://schemas.microsoft.com/office/powerpoint/2010/main" val="1704271954"/>
+      </p:ext>
+    </p:extLst>
+  </p:cSld>
+  <p:clrMapOvr>
+    <a:masterClrMapping/>
+  </p:clrMapOvr>
+</p:notes>
+</file>
+
+<file path=ppt/notesSlides/notesSlide8.xml><?xml version="1.0" encoding="utf-8"?>
+<p:notes xmlns:a="http://schemas.openxmlformats.org/drawingml/2006/main" xmlns:r="http://schemas.openxmlformats.org/officeDocument/2006/relationships" xmlns:p="http://schemas.openxmlformats.org/presentationml/2006/main">
+  <p:cSld>
+    <p:spTree>
+      <p:nvGrpSpPr>
+        <p:cNvPr id="1" name=""/>
+        <p:cNvGrpSpPr/>
+        <p:nvPr/>
+      </p:nvGrpSpPr>
+      <p:grpSpPr>
+        <a:xfrm>
+          <a:off x="0" y="0"/>
+          <a:ext cx="0" cy="0"/>
+          <a:chOff x="0" y="0"/>
+          <a:chExt cx="0" cy="0"/>
+        </a:xfrm>
+      </p:grpSpPr>
+      <p:sp>
+        <p:nvSpPr>
+          <p:cNvPr id="2" name="Slide Image Placeholder 1"/>
+          <p:cNvSpPr>
+            <a:spLocks noGrp="1" noRot="1" noChangeAspect="1"/>
+          </p:cNvSpPr>
+          <p:nvPr>
+            <p:ph type="sldImg"/>
+          </p:nvPr>
+        </p:nvSpPr>
+        <p:spPr/>
+      </p:sp>
+      <p:sp>
+        <p:nvSpPr>
+          <p:cNvPr id="3" name="Notes Placeholder 2"/>
+          <p:cNvSpPr>
+            <a:spLocks noGrp="1"/>
+          </p:cNvSpPr>
+          <p:nvPr>
+            <p:ph type="body" idx="1"/>
+          </p:nvPr>
+        </p:nvSpPr>
+        <p:spPr/>
+        <p:txBody>
+          <a:bodyPr/>
+          <a:lstStyle/>
+          <a:p>
+            <a:pPr marL="0" marR="0" lvl="0" indent="0" algn="l" defTabSz="914400" rtl="0" eaLnBrk="1" fontAlgn="auto" latinLnBrk="0" hangingPunct="1">
+              <a:lnSpc>
+                <a:spcPct val="100000"/>
+              </a:lnSpc>
+              <a:spcBef>
+                <a:spcPts val="0"/>
+              </a:spcBef>
+              <a:spcAft>
+                <a:spcPts val="0"/>
+              </a:spcAft>
+              <a:buClrTx/>
+              <a:buSzTx/>
+              <a:buFontTx/>
+              <a:buNone/>
+              <a:tabLst/>
+              <a:defRPr/>
+            </a:pPr>
+            <a:endParaRPr lang="en-US" b="0" dirty="0"/>
+          </a:p>
+          <a:p>
+            <a:endParaRPr lang="en-US" dirty="0"/>
+          </a:p>
+        </p:txBody>
+      </p:sp>
+      <p:sp>
+        <p:nvSpPr>
+          <p:cNvPr id="4" name="Slide Number Placeholder 3"/>
+          <p:cNvSpPr>
+            <a:spLocks noGrp="1"/>
+          </p:cNvSpPr>
+          <p:nvPr>
+            <p:ph type="sldNum" sz="quarter" idx="5"/>
+          </p:nvPr>
+        </p:nvSpPr>
+        <p:spPr/>
+        <p:txBody>
+          <a:bodyPr/>
+          <a:lstStyle/>
+          <a:p>
+            <a:fld id="{6836151D-8E10-441D-ACAB-C0A69E248B8E}" type="slidenum">
+              <a:rPr lang="en-US" smtClean="0"/>
+              <a:t>19</a:t>
+            </a:fld>
+            <a:endParaRPr lang="en-US"/>
+          </a:p>
+        </p:txBody>
+      </p:sp>
+    </p:spTree>
+    <p:extLst>
+      <p:ext uri="{BB962C8B-B14F-4D97-AF65-F5344CB8AC3E}">
         <p14:creationId xmlns:p14="http://schemas.microsoft.com/office/powerpoint/2010/main" val="2519870461"/>
+      </p:ext>
+    </p:extLst>
+  </p:cSld>
+  <p:clrMapOvr>
+    <a:masterClrMapping/>
+  </p:clrMapOvr>
+</p:notes>
+</file>
+
+<file path=ppt/notesSlides/notesSlide9.xml><?xml version="1.0" encoding="utf-8"?>
+<p:notes xmlns:a="http://schemas.openxmlformats.org/drawingml/2006/main" xmlns:r="http://schemas.openxmlformats.org/officeDocument/2006/relationships" xmlns:p="http://schemas.openxmlformats.org/presentationml/2006/main">
+  <p:cSld>
+    <p:spTree>
+      <p:nvGrpSpPr>
+        <p:cNvPr id="1" name=""/>
+        <p:cNvGrpSpPr/>
+        <p:nvPr/>
+      </p:nvGrpSpPr>
+      <p:grpSpPr>
+        <a:xfrm>
+          <a:off x="0" y="0"/>
+          <a:ext cx="0" cy="0"/>
+          <a:chOff x="0" y="0"/>
+          <a:chExt cx="0" cy="0"/>
+        </a:xfrm>
+      </p:grpSpPr>
+      <p:sp>
+        <p:nvSpPr>
+          <p:cNvPr id="2" name="Slide Image Placeholder 1"/>
+          <p:cNvSpPr>
+            <a:spLocks noGrp="1" noRot="1" noChangeAspect="1"/>
+          </p:cNvSpPr>
+          <p:nvPr>
+            <p:ph type="sldImg"/>
+          </p:nvPr>
+        </p:nvSpPr>
+        <p:spPr/>
+      </p:sp>
+      <p:sp>
+        <p:nvSpPr>
+          <p:cNvPr id="3" name="Notes Placeholder 2"/>
+          <p:cNvSpPr>
+            <a:spLocks noGrp="1"/>
+          </p:cNvSpPr>
+          <p:nvPr>
+            <p:ph type="body" idx="1"/>
+          </p:nvPr>
+        </p:nvSpPr>
+        <p:spPr/>
+        <p:txBody>
+          <a:bodyPr/>
+          <a:lstStyle/>
+          <a:p>
+            <a:r>
+              <a:rPr lang="bs-Latn-BA" dirty="0"/>
+              <a:t>Primjer jednog zahtjeva i odgovora. Možemo </a:t>
+            </a:r>
+            <a:r>
+              <a:rPr lang="bs-Latn-BA" dirty="0" err="1"/>
+              <a:t>upčiti</a:t>
+            </a:r>
+            <a:r>
+              <a:rPr lang="bs-Latn-BA" dirty="0"/>
+              <a:t> </a:t>
+            </a:r>
+            <a:r>
+              <a:rPr lang="bs-Latn-BA" dirty="0" err="1"/>
+              <a:t>Envelop</a:t>
+            </a:r>
+            <a:r>
+              <a:rPr lang="bs-Latn-BA" dirty="0"/>
+              <a:t> objekat unutar poruke, a koji se </a:t>
+            </a:r>
+            <a:r>
+              <a:rPr lang="bs-Latn-BA" dirty="0" err="1"/>
+              <a:t>satoji</a:t>
+            </a:r>
+            <a:r>
+              <a:rPr lang="bs-Latn-BA" dirty="0"/>
+              <a:t> od </a:t>
+            </a:r>
+            <a:r>
+              <a:rPr lang="bs-Latn-BA" dirty="0" err="1"/>
+              <a:t>namespace</a:t>
+            </a:r>
+            <a:r>
+              <a:rPr lang="bs-Latn-BA" dirty="0"/>
+              <a:t> i atributa za </a:t>
+            </a:r>
+            <a:r>
+              <a:rPr lang="bs-Latn-BA" dirty="0" err="1"/>
+              <a:t>encodiranje</a:t>
+            </a:r>
+            <a:r>
+              <a:rPr lang="bs-Latn-BA" dirty="0"/>
+              <a:t>.</a:t>
+            </a:r>
+            <a:endParaRPr lang="en-US" dirty="0"/>
+          </a:p>
+        </p:txBody>
+      </p:sp>
+      <p:sp>
+        <p:nvSpPr>
+          <p:cNvPr id="4" name="Slide Number Placeholder 3"/>
+          <p:cNvSpPr>
+            <a:spLocks noGrp="1"/>
+          </p:cNvSpPr>
+          <p:nvPr>
+            <p:ph type="sldNum" sz="quarter" idx="5"/>
+          </p:nvPr>
+        </p:nvSpPr>
+        <p:spPr/>
+        <p:txBody>
+          <a:bodyPr/>
+          <a:lstStyle/>
+          <a:p>
+            <a:fld id="{6836151D-8E10-441D-ACAB-C0A69E248B8E}" type="slidenum">
+              <a:rPr lang="en-US" smtClean="0"/>
+              <a:t>20</a:t>
+            </a:fld>
+            <a:endParaRPr lang="en-US"/>
+          </a:p>
+        </p:txBody>
+      </p:sp>
+    </p:spTree>
+    <p:extLst>
+      <p:ext uri="{BB962C8B-B14F-4D97-AF65-F5344CB8AC3E}">
+        <p14:creationId xmlns:p14="http://schemas.microsoft.com/office/powerpoint/2010/main" val="3546868344"/>
       </p:ext>
     </p:extLst>
   </p:cSld>
@@ -1296,7 +1966,7 @@
           <a:p>
             <a:fld id="{0690FD28-C209-4D80-8452-8D14B9AF5D27}" type="datetimeFigureOut">
               <a:rPr lang="en-US" smtClean="0"/>
-              <a:t>3/12/2019</a:t>
+              <a:t>3/15/2019</a:t>
             </a:fld>
             <a:endParaRPr lang="en-US"/>
           </a:p>
@@ -1494,7 +2164,7 @@
           <a:p>
             <a:fld id="{0690FD28-C209-4D80-8452-8D14B9AF5D27}" type="datetimeFigureOut">
               <a:rPr lang="en-US" smtClean="0"/>
-              <a:t>3/12/2019</a:t>
+              <a:t>3/15/2019</a:t>
             </a:fld>
             <a:endParaRPr lang="en-US"/>
           </a:p>
@@ -1702,7 +2372,7 @@
           <a:p>
             <a:fld id="{0690FD28-C209-4D80-8452-8D14B9AF5D27}" type="datetimeFigureOut">
               <a:rPr lang="en-US" smtClean="0"/>
-              <a:t>3/12/2019</a:t>
+              <a:t>3/15/2019</a:t>
             </a:fld>
             <a:endParaRPr lang="en-US"/>
           </a:p>
@@ -1900,7 +2570,7 @@
           <a:p>
             <a:fld id="{0690FD28-C209-4D80-8452-8D14B9AF5D27}" type="datetimeFigureOut">
               <a:rPr lang="en-US" smtClean="0"/>
-              <a:t>3/12/2019</a:t>
+              <a:t>3/15/2019</a:t>
             </a:fld>
             <a:endParaRPr lang="en-US"/>
           </a:p>
@@ -2175,7 +2845,7 @@
           <a:p>
             <a:fld id="{0690FD28-C209-4D80-8452-8D14B9AF5D27}" type="datetimeFigureOut">
               <a:rPr lang="en-US" smtClean="0"/>
-              <a:t>3/12/2019</a:t>
+              <a:t>3/15/2019</a:t>
             </a:fld>
             <a:endParaRPr lang="en-US"/>
           </a:p>
@@ -2440,7 +3110,7 @@
           <a:p>
             <a:fld id="{0690FD28-C209-4D80-8452-8D14B9AF5D27}" type="datetimeFigureOut">
               <a:rPr lang="en-US" smtClean="0"/>
-              <a:t>3/12/2019</a:t>
+              <a:t>3/15/2019</a:t>
             </a:fld>
             <a:endParaRPr lang="en-US"/>
           </a:p>
@@ -2852,7 +3522,7 @@
           <a:p>
             <a:fld id="{0690FD28-C209-4D80-8452-8D14B9AF5D27}" type="datetimeFigureOut">
               <a:rPr lang="en-US" smtClean="0"/>
-              <a:t>3/12/2019</a:t>
+              <a:t>3/15/2019</a:t>
             </a:fld>
             <a:endParaRPr lang="en-US"/>
           </a:p>
@@ -2993,7 +3663,7 @@
           <a:p>
             <a:fld id="{0690FD28-C209-4D80-8452-8D14B9AF5D27}" type="datetimeFigureOut">
               <a:rPr lang="en-US" smtClean="0"/>
-              <a:t>3/12/2019</a:t>
+              <a:t>3/15/2019</a:t>
             </a:fld>
             <a:endParaRPr lang="en-US"/>
           </a:p>
@@ -3106,7 +3776,7 @@
           <a:p>
             <a:fld id="{0690FD28-C209-4D80-8452-8D14B9AF5D27}" type="datetimeFigureOut">
               <a:rPr lang="en-US" smtClean="0"/>
-              <a:t>3/12/2019</a:t>
+              <a:t>3/15/2019</a:t>
             </a:fld>
             <a:endParaRPr lang="en-US"/>
           </a:p>
@@ -3417,7 +4087,7 @@
           <a:p>
             <a:fld id="{0690FD28-C209-4D80-8452-8D14B9AF5D27}" type="datetimeFigureOut">
               <a:rPr lang="en-US" smtClean="0"/>
-              <a:t>3/12/2019</a:t>
+              <a:t>3/15/2019</a:t>
             </a:fld>
             <a:endParaRPr lang="en-US"/>
           </a:p>
@@ -3705,7 +4375,7 @@
           <a:p>
             <a:fld id="{0690FD28-C209-4D80-8452-8D14B9AF5D27}" type="datetimeFigureOut">
               <a:rPr lang="en-US" smtClean="0"/>
-              <a:t>3/12/2019</a:t>
+              <a:t>3/15/2019</a:t>
             </a:fld>
             <a:endParaRPr lang="en-US"/>
           </a:p>
@@ -3946,7 +4616,7 @@
           <a:p>
             <a:fld id="{0690FD28-C209-4D80-8452-8D14B9AF5D27}" type="datetimeFigureOut">
               <a:rPr lang="en-US" smtClean="0"/>
-              <a:t>3/12/2019</a:t>
+              <a:t>3/15/2019</a:t>
             </a:fld>
             <a:endParaRPr lang="en-US"/>
           </a:p>
@@ -4437,6 +5107,188 @@
 <file path=ppt/slides/slide10.xml><?xml version="1.0" encoding="utf-8"?>
 <p:sld xmlns:a="http://schemas.openxmlformats.org/drawingml/2006/main" xmlns:r="http://schemas.openxmlformats.org/officeDocument/2006/relationships" xmlns:p="http://schemas.openxmlformats.org/presentationml/2006/main">
   <p:cSld>
+    <p:spTree>
+      <p:nvGrpSpPr>
+        <p:cNvPr id="1" name=""/>
+        <p:cNvGrpSpPr/>
+        <p:nvPr/>
+      </p:nvGrpSpPr>
+      <p:grpSpPr>
+        <a:xfrm>
+          <a:off x="0" y="0"/>
+          <a:ext cx="0" cy="0"/>
+          <a:chOff x="0" y="0"/>
+          <a:chExt cx="0" cy="0"/>
+        </a:xfrm>
+      </p:grpSpPr>
+      <p:sp>
+        <p:nvSpPr>
+          <p:cNvPr id="2" name="Title 1">
+            <a:extLst>
+              <a:ext uri="{FF2B5EF4-FFF2-40B4-BE49-F238E27FC236}">
+                <a16:creationId xmlns:a16="http://schemas.microsoft.com/office/drawing/2014/main" id="{ADE6168C-1024-4679-9157-7E9179CA7734}"/>
+              </a:ext>
+            </a:extLst>
+          </p:cNvPr>
+          <p:cNvSpPr>
+            <a:spLocks noGrp="1"/>
+          </p:cNvSpPr>
+          <p:nvPr>
+            <p:ph type="title"/>
+          </p:nvPr>
+        </p:nvSpPr>
+        <p:spPr/>
+        <p:txBody>
+          <a:bodyPr/>
+          <a:lstStyle/>
+          <a:p>
+            <a:r>
+              <a:rPr lang="bs-Latn-BA" dirty="0"/>
+              <a:t>Osnovni pojmovi </a:t>
+            </a:r>
+            <a:endParaRPr lang="en-US" dirty="0"/>
+          </a:p>
+        </p:txBody>
+      </p:sp>
+      <p:sp>
+        <p:nvSpPr>
+          <p:cNvPr id="3" name="Content Placeholder 2">
+            <a:extLst>
+              <a:ext uri="{FF2B5EF4-FFF2-40B4-BE49-F238E27FC236}">
+                <a16:creationId xmlns:a16="http://schemas.microsoft.com/office/drawing/2014/main" id="{4CECA652-4929-42F0-BE42-8B5490023570}"/>
+              </a:ext>
+            </a:extLst>
+          </p:cNvPr>
+          <p:cNvSpPr>
+            <a:spLocks noGrp="1"/>
+          </p:cNvSpPr>
+          <p:nvPr>
+            <p:ph idx="1"/>
+          </p:nvPr>
+        </p:nvSpPr>
+        <p:spPr/>
+        <p:txBody>
+          <a:bodyPr>
+            <a:normAutofit lnSpcReduction="10000"/>
+          </a:bodyPr>
+          <a:lstStyle/>
+          <a:p>
+            <a:r>
+              <a:rPr lang="bs-Latn-BA" dirty="0"/>
+              <a:t>Web Servisi</a:t>
+            </a:r>
+          </a:p>
+          <a:p>
+            <a:pPr lvl="1"/>
+            <a:r>
+              <a:rPr lang="bs-Latn-BA" dirty="0"/>
+              <a:t>XML</a:t>
+            </a:r>
+          </a:p>
+          <a:p>
+            <a:r>
+              <a:rPr lang="bs-Latn-BA" dirty="0"/>
+              <a:t>Web API</a:t>
+            </a:r>
+          </a:p>
+          <a:p>
+            <a:pPr lvl="1"/>
+            <a:r>
+              <a:rPr lang="bs-Latn-BA" dirty="0"/>
+              <a:t>JSON</a:t>
+            </a:r>
+          </a:p>
+          <a:p>
+            <a:pPr lvl="1"/>
+            <a:endParaRPr lang="bs-Latn-BA" dirty="0"/>
+          </a:p>
+          <a:p>
+            <a:r>
+              <a:rPr lang="bs-Latn-BA" dirty="0"/>
+              <a:t>SOAP </a:t>
+            </a:r>
+            <a:r>
+              <a:rPr lang="bs-Latn-BA" dirty="0" err="1"/>
+              <a:t>vs</a:t>
+            </a:r>
+            <a:r>
+              <a:rPr lang="bs-Latn-BA" dirty="0"/>
+              <a:t>. REST servisi</a:t>
+            </a:r>
+          </a:p>
+          <a:p>
+            <a:pPr lvl="1"/>
+            <a:r>
+              <a:rPr lang="bs-Latn-BA" dirty="0"/>
+              <a:t>Web servisi bazirani na SOAP protokolu (</a:t>
+            </a:r>
+            <a:r>
+              <a:rPr lang="bs-Latn-BA" dirty="0" err="1"/>
+              <a:t>Simple</a:t>
+            </a:r>
+            <a:r>
+              <a:rPr lang="bs-Latn-BA" dirty="0"/>
+              <a:t> </a:t>
+            </a:r>
+            <a:r>
+              <a:rPr lang="bs-Latn-BA" dirty="0" err="1"/>
+              <a:t>Object</a:t>
+            </a:r>
+            <a:r>
+              <a:rPr lang="bs-Latn-BA" dirty="0"/>
+              <a:t> Access </a:t>
+            </a:r>
+            <a:r>
+              <a:rPr lang="bs-Latn-BA" dirty="0" err="1"/>
+              <a:t>Protocol</a:t>
+            </a:r>
+            <a:r>
+              <a:rPr lang="bs-Latn-BA" dirty="0"/>
+              <a:t>). Predstavlja XML-bazirani protokol za pristup web servisima.</a:t>
+            </a:r>
+          </a:p>
+          <a:p>
+            <a:pPr lvl="1"/>
+            <a:r>
+              <a:rPr lang="bs-Latn-BA" dirty="0"/>
+              <a:t>Web servisi bazirani na REST protokolu (</a:t>
+            </a:r>
+            <a:r>
+              <a:rPr lang="bs-Latn-BA" dirty="0" err="1"/>
+              <a:t>Representational</a:t>
+            </a:r>
+            <a:r>
+              <a:rPr lang="bs-Latn-BA" dirty="0"/>
+              <a:t> State Transfer ) Predstavlja web servis baziran na skupu ograničenja u odnosu na prethodni na definisanje web servisa. </a:t>
+            </a:r>
+            <a:r>
+              <a:rPr lang="bs-Latn-BA" dirty="0" err="1"/>
+              <a:t>Omogućava</a:t>
+            </a:r>
+            <a:r>
+              <a:rPr lang="bs-Latn-BA" dirty="0"/>
+              <a:t> širi spektar klijenata koji ga mogu koristiti.  </a:t>
+            </a:r>
+            <a:endParaRPr lang="en-US" dirty="0"/>
+          </a:p>
+        </p:txBody>
+      </p:sp>
+    </p:spTree>
+    <p:extLst>
+      <p:ext uri="{BB962C8B-B14F-4D97-AF65-F5344CB8AC3E}">
+        <p14:creationId xmlns:p14="http://schemas.microsoft.com/office/powerpoint/2010/main" val="2673011417"/>
+      </p:ext>
+    </p:extLst>
+  </p:cSld>
+  <p:clrMapOvr>
+    <a:masterClrMapping/>
+  </p:clrMapOvr>
+</p:sld>
+</file>
+
+<file path=ppt/slides/slide11.xml><?xml version="1.0" encoding="utf-8"?>
+<p:sld xmlns:a="http://schemas.openxmlformats.org/drawingml/2006/main" xmlns:r="http://schemas.openxmlformats.org/officeDocument/2006/relationships" xmlns:p="http://schemas.openxmlformats.org/presentationml/2006/main">
+  <p:cSld>
     <p:bg>
       <p:bgPr>
         <a:solidFill>
@@ -4503,7 +5355,7 @@
 </p:sld>
 </file>
 
-<file path=ppt/slides/slide11.xml><?xml version="1.0" encoding="utf-8"?>
+<file path=ppt/slides/slide12.xml><?xml version="1.0" encoding="utf-8"?>
 <p:sld xmlns:a="http://schemas.openxmlformats.org/drawingml/2006/main" xmlns:r="http://schemas.openxmlformats.org/officeDocument/2006/relationships" xmlns:p="http://schemas.openxmlformats.org/presentationml/2006/main">
   <p:cSld>
     <p:spTree>
@@ -4568,7 +5420,140 @@
 </p:sld>
 </file>
 
-<file path=ppt/slides/slide12.xml><?xml version="1.0" encoding="utf-8"?>
+<file path=ppt/slides/slide13.xml><?xml version="1.0" encoding="utf-8"?>
+<p:sld xmlns:a="http://schemas.openxmlformats.org/drawingml/2006/main" xmlns:r="http://schemas.openxmlformats.org/officeDocument/2006/relationships" xmlns:p="http://schemas.openxmlformats.org/presentationml/2006/main">
+  <p:cSld>
+    <p:spTree>
+      <p:nvGrpSpPr>
+        <p:cNvPr id="1" name=""/>
+        <p:cNvGrpSpPr/>
+        <p:nvPr/>
+      </p:nvGrpSpPr>
+      <p:grpSpPr>
+        <a:xfrm>
+          <a:off x="0" y="0"/>
+          <a:ext cx="0" cy="0"/>
+          <a:chOff x="0" y="0"/>
+          <a:chExt cx="0" cy="0"/>
+        </a:xfrm>
+      </p:grpSpPr>
+      <p:sp>
+        <p:nvSpPr>
+          <p:cNvPr id="2" name="Title 1">
+            <a:extLst>
+              <a:ext uri="{FF2B5EF4-FFF2-40B4-BE49-F238E27FC236}">
+                <a16:creationId xmlns:a16="http://schemas.microsoft.com/office/drawing/2014/main" id="{ADE6168C-1024-4679-9157-7E9179CA7734}"/>
+              </a:ext>
+            </a:extLst>
+          </p:cNvPr>
+          <p:cNvSpPr>
+            <a:spLocks noGrp="1"/>
+          </p:cNvSpPr>
+          <p:nvPr>
+            <p:ph type="title"/>
+          </p:nvPr>
+        </p:nvSpPr>
+        <p:spPr/>
+        <p:txBody>
+          <a:bodyPr/>
+          <a:lstStyle/>
+          <a:p>
+            <a:r>
+              <a:rPr lang="bs-Latn-BA" dirty="0"/>
+              <a:t>SOAP Servisi </a:t>
+            </a:r>
+            <a:endParaRPr lang="en-US" dirty="0"/>
+          </a:p>
+        </p:txBody>
+      </p:sp>
+      <p:sp>
+        <p:nvSpPr>
+          <p:cNvPr id="3" name="Content Placeholder 2">
+            <a:extLst>
+              <a:ext uri="{FF2B5EF4-FFF2-40B4-BE49-F238E27FC236}">
+                <a16:creationId xmlns:a16="http://schemas.microsoft.com/office/drawing/2014/main" id="{4CECA652-4929-42F0-BE42-8B5490023570}"/>
+              </a:ext>
+            </a:extLst>
+          </p:cNvPr>
+          <p:cNvSpPr>
+            <a:spLocks noGrp="1"/>
+          </p:cNvSpPr>
+          <p:nvPr>
+            <p:ph idx="1"/>
+          </p:nvPr>
+        </p:nvSpPr>
+        <p:spPr/>
+        <p:txBody>
+          <a:bodyPr/>
+          <a:lstStyle/>
+          <a:p>
+            <a:r>
+              <a:rPr lang="bs-Latn-BA" dirty="0"/>
+              <a:t>Predstavljaju dinamički modularne i distribuirane aplikacije </a:t>
+            </a:r>
+          </a:p>
+          <a:p>
+            <a:pPr lvl="1"/>
+            <a:r>
+              <a:rPr lang="bs-Latn-BA" dirty="0"/>
+              <a:t>Koriste za pristupanje putem mreže u cilju </a:t>
+            </a:r>
+            <a:r>
+              <a:rPr lang="bs-Latn-BA" dirty="0" err="1"/>
+              <a:t>dobijanja</a:t>
+            </a:r>
+            <a:r>
+              <a:rPr lang="bs-Latn-BA" dirty="0"/>
+              <a:t> informacija o određenim resursima.</a:t>
+            </a:r>
+          </a:p>
+          <a:p>
+            <a:r>
+              <a:rPr lang="bs-Latn-BA" dirty="0"/>
+              <a:t>XML bazirani sistemi za razmjenu podataka putem interneta</a:t>
+            </a:r>
+          </a:p>
+          <a:p>
+            <a:pPr lvl="1"/>
+            <a:r>
+              <a:rPr lang="bs-Latn-BA" dirty="0"/>
+              <a:t>koriste direktnu komunikaciju, </a:t>
+            </a:r>
+          </a:p>
+          <a:p>
+            <a:pPr lvl="1"/>
+            <a:r>
+              <a:rPr lang="bs-Latn-BA" dirty="0"/>
+              <a:t>ponovna iskoristivost i </a:t>
+            </a:r>
+            <a:r>
+              <a:rPr lang="bs-Latn-BA" dirty="0" err="1"/>
+              <a:t>interoperabilnosti</a:t>
+            </a:r>
+            <a:r>
+              <a:rPr lang="bs-Latn-BA" dirty="0"/>
+              <a:t>.</a:t>
+            </a:r>
+          </a:p>
+          <a:p>
+            <a:endParaRPr lang="en-US" dirty="0"/>
+          </a:p>
+        </p:txBody>
+      </p:sp>
+    </p:spTree>
+    <p:extLst>
+      <p:ext uri="{BB962C8B-B14F-4D97-AF65-F5344CB8AC3E}">
+        <p14:creationId xmlns:p14="http://schemas.microsoft.com/office/powerpoint/2010/main" val="2594635463"/>
+      </p:ext>
+    </p:extLst>
+  </p:cSld>
+  <p:clrMapOvr>
+    <a:masterClrMapping/>
+  </p:clrMapOvr>
+</p:sld>
+</file>
+
+<file path=ppt/slides/slide14.xml><?xml version="1.0" encoding="utf-8"?>
 <p:sld xmlns:a="http://schemas.openxmlformats.org/drawingml/2006/main" xmlns:r="http://schemas.openxmlformats.org/officeDocument/2006/relationships" xmlns:p="http://schemas.openxmlformats.org/presentationml/2006/main">
   <p:cSld>
     <p:spTree>
@@ -4730,354 +5715,6 @@
 </p:sld>
 </file>
 
-<file path=ppt/slides/slide13.xml><?xml version="1.0" encoding="utf-8"?>
-<p:sld xmlns:a="http://schemas.openxmlformats.org/drawingml/2006/main" xmlns:r="http://schemas.openxmlformats.org/officeDocument/2006/relationships" xmlns:p="http://schemas.openxmlformats.org/presentationml/2006/main">
-  <p:cSld>
-    <p:spTree>
-      <p:nvGrpSpPr>
-        <p:cNvPr id="1" name=""/>
-        <p:cNvGrpSpPr/>
-        <p:nvPr/>
-      </p:nvGrpSpPr>
-      <p:grpSpPr>
-        <a:xfrm>
-          <a:off x="0" y="0"/>
-          <a:ext cx="0" cy="0"/>
-          <a:chOff x="0" y="0"/>
-          <a:chExt cx="0" cy="0"/>
-        </a:xfrm>
-      </p:grpSpPr>
-      <p:sp>
-        <p:nvSpPr>
-          <p:cNvPr id="2" name="Title 1">
-            <a:extLst>
-              <a:ext uri="{FF2B5EF4-FFF2-40B4-BE49-F238E27FC236}">
-                <a16:creationId xmlns:a16="http://schemas.microsoft.com/office/drawing/2014/main" id="{ADE6168C-1024-4679-9157-7E9179CA7734}"/>
-              </a:ext>
-            </a:extLst>
-          </p:cNvPr>
-          <p:cNvSpPr>
-            <a:spLocks noGrp="1"/>
-          </p:cNvSpPr>
-          <p:nvPr>
-            <p:ph type="title"/>
-          </p:nvPr>
-        </p:nvSpPr>
-        <p:spPr/>
-        <p:txBody>
-          <a:bodyPr/>
-          <a:lstStyle/>
-          <a:p>
-            <a:r>
-              <a:rPr lang="bs-Latn-BA" dirty="0"/>
-              <a:t>Web Servisi </a:t>
-            </a:r>
-            <a:endParaRPr lang="en-US" dirty="0"/>
-          </a:p>
-        </p:txBody>
-      </p:sp>
-      <p:sp>
-        <p:nvSpPr>
-          <p:cNvPr id="3" name="Content Placeholder 2">
-            <a:extLst>
-              <a:ext uri="{FF2B5EF4-FFF2-40B4-BE49-F238E27FC236}">
-                <a16:creationId xmlns:a16="http://schemas.microsoft.com/office/drawing/2014/main" id="{4CECA652-4929-42F0-BE42-8B5490023570}"/>
-              </a:ext>
-            </a:extLst>
-          </p:cNvPr>
-          <p:cNvSpPr>
-            <a:spLocks noGrp="1"/>
-          </p:cNvSpPr>
-          <p:nvPr>
-            <p:ph idx="1"/>
-          </p:nvPr>
-        </p:nvSpPr>
-        <p:spPr/>
-        <p:txBody>
-          <a:bodyPr/>
-          <a:lstStyle/>
-          <a:p>
-            <a:r>
-              <a:rPr lang="bs-Latn-BA" dirty="0"/>
-              <a:t>XML bazirani sistemi za razmjenu podataka putem interneta</a:t>
-            </a:r>
-          </a:p>
-          <a:p>
-            <a:pPr lvl="1"/>
-            <a:r>
-              <a:rPr lang="bs-Latn-BA" dirty="0"/>
-              <a:t>koristeći direktnu komunikaciju, </a:t>
-            </a:r>
-          </a:p>
-          <a:p>
-            <a:pPr lvl="1"/>
-            <a:r>
-              <a:rPr lang="bs-Latn-BA" dirty="0"/>
-              <a:t>ponovna iskoristivost i </a:t>
-            </a:r>
-            <a:r>
-              <a:rPr lang="bs-Latn-BA" dirty="0" err="1"/>
-              <a:t>interoperabilnosti</a:t>
-            </a:r>
-            <a:r>
-              <a:rPr lang="bs-Latn-BA" dirty="0"/>
-              <a:t>.</a:t>
-            </a:r>
-          </a:p>
-          <a:p>
-            <a:r>
-              <a:rPr lang="bs-Latn-BA" dirty="0"/>
-              <a:t>predstavljaju dinamički modularne i distribuirane aplikacije </a:t>
-            </a:r>
-          </a:p>
-          <a:p>
-            <a:pPr lvl="1"/>
-            <a:r>
-              <a:rPr lang="bs-Latn-BA" dirty="0"/>
-              <a:t>Koriste za pristupanje putem mreže u cilju </a:t>
-            </a:r>
-            <a:r>
-              <a:rPr lang="bs-Latn-BA" dirty="0" err="1"/>
-              <a:t>dobijanja</a:t>
-            </a:r>
-            <a:r>
-              <a:rPr lang="bs-Latn-BA" dirty="0"/>
-              <a:t> informacija o određenim resursima.</a:t>
-            </a:r>
-          </a:p>
-          <a:p>
-            <a:endParaRPr lang="en-US" dirty="0"/>
-          </a:p>
-        </p:txBody>
-      </p:sp>
-    </p:spTree>
-    <p:extLst>
-      <p:ext uri="{BB962C8B-B14F-4D97-AF65-F5344CB8AC3E}">
-        <p14:creationId xmlns:p14="http://schemas.microsoft.com/office/powerpoint/2010/main" val="2594635463"/>
-      </p:ext>
-    </p:extLst>
-  </p:cSld>
-  <p:clrMapOvr>
-    <a:masterClrMapping/>
-  </p:clrMapOvr>
-</p:sld>
-</file>
-
-<file path=ppt/slides/slide14.xml><?xml version="1.0" encoding="utf-8"?>
-<p:sld xmlns:a="http://schemas.openxmlformats.org/drawingml/2006/main" xmlns:r="http://schemas.openxmlformats.org/officeDocument/2006/relationships" xmlns:p="http://schemas.openxmlformats.org/presentationml/2006/main">
-  <p:cSld>
-    <p:spTree>
-      <p:nvGrpSpPr>
-        <p:cNvPr id="1" name=""/>
-        <p:cNvGrpSpPr/>
-        <p:nvPr/>
-      </p:nvGrpSpPr>
-      <p:grpSpPr>
-        <a:xfrm>
-          <a:off x="0" y="0"/>
-          <a:ext cx="0" cy="0"/>
-          <a:chOff x="0" y="0"/>
-          <a:chExt cx="0" cy="0"/>
-        </a:xfrm>
-      </p:grpSpPr>
-      <p:sp>
-        <p:nvSpPr>
-          <p:cNvPr id="2" name="Title 1">
-            <a:extLst>
-              <a:ext uri="{FF2B5EF4-FFF2-40B4-BE49-F238E27FC236}">
-                <a16:creationId xmlns:a16="http://schemas.microsoft.com/office/drawing/2014/main" id="{ADE6168C-1024-4679-9157-7E9179CA7734}"/>
-              </a:ext>
-            </a:extLst>
-          </p:cNvPr>
-          <p:cNvSpPr>
-            <a:spLocks noGrp="1"/>
-          </p:cNvSpPr>
-          <p:nvPr>
-            <p:ph type="title"/>
-          </p:nvPr>
-        </p:nvSpPr>
-        <p:spPr/>
-        <p:txBody>
-          <a:bodyPr>
-            <a:normAutofit/>
-          </a:bodyPr>
-          <a:lstStyle/>
-          <a:p>
-            <a:r>
-              <a:rPr lang="bs-Latn-BA" dirty="0"/>
-              <a:t>Osnovne komponente Web servisa:</a:t>
-            </a:r>
-            <a:br>
-              <a:rPr lang="bs-Latn-BA" dirty="0"/>
-            </a:br>
-            <a:endParaRPr lang="en-US" dirty="0"/>
-          </a:p>
-        </p:txBody>
-      </p:sp>
-      <p:sp>
-        <p:nvSpPr>
-          <p:cNvPr id="3" name="Content Placeholder 2">
-            <a:extLst>
-              <a:ext uri="{FF2B5EF4-FFF2-40B4-BE49-F238E27FC236}">
-                <a16:creationId xmlns:a16="http://schemas.microsoft.com/office/drawing/2014/main" id="{4CECA652-4929-42F0-BE42-8B5490023570}"/>
-              </a:ext>
-            </a:extLst>
-          </p:cNvPr>
-          <p:cNvSpPr>
-            <a:spLocks noGrp="1"/>
-          </p:cNvSpPr>
-          <p:nvPr>
-            <p:ph idx="1"/>
-          </p:nvPr>
-        </p:nvSpPr>
-        <p:spPr/>
-        <p:txBody>
-          <a:bodyPr/>
-          <a:lstStyle/>
-          <a:p>
-            <a:r>
-              <a:rPr lang="bs-Latn-BA" dirty="0"/>
-              <a:t>XML (</a:t>
-            </a:r>
-            <a:r>
-              <a:rPr lang="bs-Latn-BA" dirty="0" err="1"/>
-              <a:t>Extensible</a:t>
-            </a:r>
-            <a:r>
-              <a:rPr lang="bs-Latn-BA" dirty="0"/>
-              <a:t> </a:t>
-            </a:r>
-            <a:r>
-              <a:rPr lang="bs-Latn-BA" dirty="0" err="1"/>
-              <a:t>Markup</a:t>
-            </a:r>
-            <a:r>
-              <a:rPr lang="bs-Latn-BA" dirty="0"/>
-              <a:t> </a:t>
-            </a:r>
-            <a:r>
-              <a:rPr lang="bs-Latn-BA" dirty="0" err="1"/>
-              <a:t>Language</a:t>
-            </a:r>
-            <a:r>
-              <a:rPr lang="bs-Latn-BA" dirty="0"/>
-              <a:t>)</a:t>
-            </a:r>
-          </a:p>
-          <a:p>
-            <a:r>
-              <a:rPr lang="bs-Latn-BA" dirty="0"/>
-              <a:t>SOAP (</a:t>
-            </a:r>
-            <a:r>
-              <a:rPr lang="bs-Latn-BA" dirty="0" err="1"/>
-              <a:t>Simple</a:t>
-            </a:r>
-            <a:r>
-              <a:rPr lang="bs-Latn-BA" dirty="0"/>
-              <a:t> </a:t>
-            </a:r>
-            <a:r>
-              <a:rPr lang="bs-Latn-BA" dirty="0" err="1"/>
-              <a:t>Object</a:t>
-            </a:r>
-            <a:r>
-              <a:rPr lang="bs-Latn-BA" dirty="0"/>
-              <a:t> Access </a:t>
-            </a:r>
-            <a:r>
-              <a:rPr lang="bs-Latn-BA" dirty="0" err="1"/>
-              <a:t>Protocol</a:t>
-            </a:r>
-            <a:r>
-              <a:rPr lang="bs-Latn-BA" dirty="0"/>
-              <a:t>)</a:t>
-            </a:r>
-          </a:p>
-          <a:p>
-            <a:r>
-              <a:rPr lang="bs-Latn-BA" dirty="0"/>
-              <a:t>UDDI (</a:t>
-            </a:r>
-            <a:r>
-              <a:rPr lang="bs-Latn-BA" dirty="0" err="1"/>
-              <a:t>Universal</a:t>
-            </a:r>
-            <a:r>
-              <a:rPr lang="bs-Latn-BA" dirty="0"/>
-              <a:t> </a:t>
-            </a:r>
-            <a:r>
-              <a:rPr lang="bs-Latn-BA" dirty="0" err="1"/>
-              <a:t>Description</a:t>
-            </a:r>
-            <a:r>
-              <a:rPr lang="bs-Latn-BA" dirty="0"/>
-              <a:t>, </a:t>
-            </a:r>
-            <a:r>
-              <a:rPr lang="bs-Latn-BA" dirty="0" err="1"/>
-              <a:t>Discovery</a:t>
-            </a:r>
-            <a:r>
-              <a:rPr lang="bs-Latn-BA" dirty="0"/>
-              <a:t> </a:t>
-            </a:r>
-            <a:r>
-              <a:rPr lang="bs-Latn-BA" dirty="0" err="1"/>
-              <a:t>and</a:t>
-            </a:r>
-            <a:r>
-              <a:rPr lang="bs-Latn-BA" dirty="0"/>
-              <a:t> </a:t>
-            </a:r>
-            <a:r>
-              <a:rPr lang="bs-Latn-BA" dirty="0" err="1"/>
-              <a:t>Integration</a:t>
-            </a:r>
-            <a:r>
-              <a:rPr lang="bs-Latn-BA" dirty="0"/>
-              <a:t>)</a:t>
-            </a:r>
-          </a:p>
-          <a:p>
-            <a:r>
-              <a:rPr lang="bs-Latn-BA" dirty="0"/>
-              <a:t>WSDL (Web Servise </a:t>
-            </a:r>
-            <a:r>
-              <a:rPr lang="bs-Latn-BA" dirty="0" err="1"/>
-              <a:t>Description</a:t>
-            </a:r>
-            <a:r>
-              <a:rPr lang="bs-Latn-BA" dirty="0"/>
-              <a:t> </a:t>
-            </a:r>
-            <a:r>
-              <a:rPr lang="bs-Latn-BA" dirty="0" err="1"/>
-              <a:t>Language</a:t>
-            </a:r>
-            <a:r>
-              <a:rPr lang="bs-Latn-BA" dirty="0"/>
-              <a:t>)</a:t>
-            </a:r>
-            <a:endParaRPr lang="en-US" dirty="0"/>
-          </a:p>
-        </p:txBody>
-      </p:sp>
-    </p:spTree>
-    <p:extLst>
-      <p:ext uri="{BB962C8B-B14F-4D97-AF65-F5344CB8AC3E}">
-        <p14:creationId xmlns:p14="http://schemas.microsoft.com/office/powerpoint/2010/main" val="2136947034"/>
-      </p:ext>
-    </p:extLst>
-  </p:cSld>
-  <p:clrMapOvr>
-    <a:masterClrMapping/>
-  </p:clrMapOvr>
-</p:sld>
-</file>
-
 <file path=ppt/slides/slide15.xml><?xml version="1.0" encoding="utf-8"?>
 <p:sld xmlns:a="http://schemas.openxmlformats.org/drawingml/2006/main" xmlns:r="http://schemas.openxmlformats.org/officeDocument/2006/relationships" xmlns:p="http://schemas.openxmlformats.org/presentationml/2006/main">
   <p:cSld>
@@ -5100,7 +5737,7 @@
           <p:cNvPr id="2" name="Title 1">
             <a:extLst>
               <a:ext uri="{FF2B5EF4-FFF2-40B4-BE49-F238E27FC236}">
-                <a16:creationId xmlns:a16="http://schemas.microsoft.com/office/drawing/2014/main" id="{7F86684E-502E-4A7C-902D-396B01C5F0E0}"/>
+                <a16:creationId xmlns:a16="http://schemas.microsoft.com/office/drawing/2014/main" id="{ADE6168C-1024-4679-9157-7E9179CA7734}"/>
               </a:ext>
             </a:extLst>
           </p:cNvPr>
@@ -5109,6 +5746,40 @@
           </p:cNvSpPr>
           <p:nvPr>
             <p:ph type="title"/>
+          </p:nvPr>
+        </p:nvSpPr>
+        <p:spPr/>
+        <p:txBody>
+          <a:bodyPr>
+            <a:normAutofit/>
+          </a:bodyPr>
+          <a:lstStyle/>
+          <a:p>
+            <a:r>
+              <a:rPr lang="bs-Latn-BA" dirty="0"/>
+              <a:t>Osnovne komponente Web servisa:</a:t>
+            </a:r>
+            <a:br>
+              <a:rPr lang="bs-Latn-BA" dirty="0"/>
+            </a:br>
+            <a:endParaRPr lang="en-US" dirty="0"/>
+          </a:p>
+        </p:txBody>
+      </p:sp>
+      <p:sp>
+        <p:nvSpPr>
+          <p:cNvPr id="3" name="Content Placeholder 2">
+            <a:extLst>
+              <a:ext uri="{FF2B5EF4-FFF2-40B4-BE49-F238E27FC236}">
+                <a16:creationId xmlns:a16="http://schemas.microsoft.com/office/drawing/2014/main" id="{4CECA652-4929-42F0-BE42-8B5490023570}"/>
+              </a:ext>
+            </a:extLst>
+          </p:cNvPr>
+          <p:cNvSpPr>
+            <a:spLocks noGrp="1"/>
+          </p:cNvSpPr>
+          <p:nvPr>
+            <p:ph idx="1"/>
           </p:nvPr>
         </p:nvSpPr>
         <p:spPr/>
@@ -5118,130 +5789,19 @@
           <a:p>
             <a:r>
               <a:rPr lang="bs-Latn-BA" dirty="0"/>
-              <a:t>Proširene Web Servis </a:t>
+              <a:t>XML (</a:t>
             </a:r>
             <a:r>
               <a:rPr lang="bs-Latn-BA" dirty="0" err="1"/>
-              <a:t>konponente</a:t>
-            </a:r>
-            <a:endParaRPr lang="en-US" dirty="0"/>
-          </a:p>
-        </p:txBody>
-      </p:sp>
-      <p:sp>
-        <p:nvSpPr>
-          <p:cNvPr id="3" name="Content Placeholder 2">
-            <a:extLst>
-              <a:ext uri="{FF2B5EF4-FFF2-40B4-BE49-F238E27FC236}">
-                <a16:creationId xmlns:a16="http://schemas.microsoft.com/office/drawing/2014/main" id="{018F9976-678E-4F32-B35E-8BD951E6933F}"/>
-              </a:ext>
-            </a:extLst>
-          </p:cNvPr>
-          <p:cNvSpPr>
-            <a:spLocks noGrp="1"/>
-          </p:cNvSpPr>
-          <p:nvPr>
-            <p:ph idx="1"/>
-          </p:nvPr>
-        </p:nvSpPr>
-        <p:spPr/>
-        <p:txBody>
-          <a:bodyPr/>
-          <a:lstStyle/>
-          <a:p>
-            <a:r>
-              <a:rPr lang="bs-Latn-BA" b="1" dirty="0"/>
-              <a:t>WS-</a:t>
-            </a:r>
-            <a:r>
-              <a:rPr lang="bs-Latn-BA" b="1" dirty="0" err="1"/>
-              <a:t>Security</a:t>
-            </a:r>
-            <a:r>
-              <a:rPr lang="bs-Latn-BA" dirty="0"/>
-              <a:t> – specifikacija koja definiše enkripciju i digitalne potpise poruka</a:t>
-            </a:r>
-          </a:p>
-          <a:p>
-            <a:r>
-              <a:rPr lang="bs-Latn-BA" b="1" dirty="0"/>
-              <a:t>WS-</a:t>
-            </a:r>
-            <a:r>
-              <a:rPr lang="bs-Latn-BA" b="1" dirty="0" err="1"/>
-              <a:t>Policy</a:t>
-            </a:r>
-            <a:r>
-              <a:rPr lang="bs-Latn-BA" dirty="0"/>
-              <a:t> – specifikacija koja proširuje WS-</a:t>
+              <a:t>Extensible</a:t>
+            </a:r>
+            <a:r>
+              <a:rPr lang="bs-Latn-BA" dirty="0"/>
+              <a:t> </a:t>
             </a:r>
             <a:r>
               <a:rPr lang="bs-Latn-BA" dirty="0" err="1"/>
-              <a:t>Security</a:t>
-            </a:r>
-            <a:r>
-              <a:rPr lang="bs-Latn-BA" dirty="0"/>
-              <a:t> specifikaciju sa detaljima ko i na koji način će koristiti servis.</a:t>
-            </a:r>
-          </a:p>
-          <a:p>
-            <a:r>
-              <a:rPr lang="bs-Latn-BA" b="1" dirty="0"/>
-              <a:t>WS-I</a:t>
-            </a:r>
-            <a:r>
-              <a:rPr lang="bs-Latn-BA" dirty="0"/>
-              <a:t> – skup specifikacija za </a:t>
-            </a:r>
-            <a:r>
-              <a:rPr lang="bs-Latn-BA" dirty="0" err="1"/>
-              <a:t>prevazilaženje</a:t>
-            </a:r>
-            <a:r>
-              <a:rPr lang="bs-Latn-BA" dirty="0"/>
-              <a:t> problema u </a:t>
-            </a:r>
-            <a:r>
-              <a:rPr lang="bs-Latn-BA" dirty="0" err="1"/>
-              <a:t>verzioniranju</a:t>
-            </a:r>
-            <a:r>
-              <a:rPr lang="bs-Latn-BA" dirty="0"/>
-              <a:t>, kao i standardne testove za otklanjanje problema.</a:t>
-            </a:r>
-          </a:p>
-          <a:p>
-            <a:r>
-              <a:rPr lang="bs-Latn-BA" dirty="0"/>
-              <a:t> </a:t>
-            </a:r>
-            <a:r>
-              <a:rPr lang="bs-Latn-BA" b="1" dirty="0"/>
-              <a:t>WS-BPEL</a:t>
-            </a:r>
-            <a:r>
-              <a:rPr lang="bs-Latn-BA" dirty="0"/>
-              <a:t> – (</a:t>
-            </a:r>
-            <a:r>
-              <a:rPr lang="bs-Latn-BA" dirty="0" err="1"/>
-              <a:t>business</a:t>
-            </a:r>
-            <a:r>
-              <a:rPr lang="bs-Latn-BA" dirty="0"/>
-              <a:t> </a:t>
-            </a:r>
-            <a:r>
-              <a:rPr lang="bs-Latn-BA" dirty="0" err="1"/>
-              <a:t>Process</a:t>
-            </a:r>
-            <a:r>
-              <a:rPr lang="bs-Latn-BA" dirty="0"/>
-              <a:t> </a:t>
-            </a:r>
-            <a:r>
-              <a:rPr lang="bs-Latn-BA" dirty="0" err="1"/>
-              <a:t>Execution</a:t>
+              <a:t>Markup</a:t>
             </a:r>
             <a:r>
               <a:rPr lang="bs-Latn-BA" dirty="0"/>
@@ -5253,18 +5813,106 @@
             </a:r>
             <a:r>
               <a:rPr lang="bs-Latn-BA" dirty="0"/>
-              <a:t>) definiše standardne akcije u </a:t>
+              <a:t>)</a:t>
+            </a:r>
+          </a:p>
+          <a:p>
+            <a:r>
+              <a:rPr lang="bs-Latn-BA" dirty="0"/>
+              <a:t>SOAP (</a:t>
             </a:r>
             <a:r>
               <a:rPr lang="bs-Latn-BA" dirty="0" err="1"/>
-              <a:t>business</a:t>
-            </a:r>
-            <a:r>
-              <a:rPr lang="bs-Latn-BA" dirty="0"/>
-              <a:t> procesu korištenjem servisa.  </a:t>
-            </a:r>
-          </a:p>
-          <a:p>
+              <a:t>Simple</a:t>
+            </a:r>
+            <a:r>
+              <a:rPr lang="bs-Latn-BA" dirty="0"/>
+              <a:t> </a:t>
+            </a:r>
+            <a:r>
+              <a:rPr lang="bs-Latn-BA" dirty="0" err="1"/>
+              <a:t>Object</a:t>
+            </a:r>
+            <a:r>
+              <a:rPr lang="bs-Latn-BA" dirty="0"/>
+              <a:t> Access </a:t>
+            </a:r>
+            <a:r>
+              <a:rPr lang="bs-Latn-BA" dirty="0" err="1"/>
+              <a:t>Protocol</a:t>
+            </a:r>
+            <a:r>
+              <a:rPr lang="bs-Latn-BA" dirty="0"/>
+              <a:t>)</a:t>
+            </a:r>
+          </a:p>
+          <a:p>
+            <a:r>
+              <a:rPr lang="bs-Latn-BA" dirty="0"/>
+              <a:t>UDDI (</a:t>
+            </a:r>
+            <a:r>
+              <a:rPr lang="bs-Latn-BA" dirty="0" err="1"/>
+              <a:t>Universal</a:t>
+            </a:r>
+            <a:r>
+              <a:rPr lang="bs-Latn-BA" dirty="0"/>
+              <a:t> </a:t>
+            </a:r>
+            <a:r>
+              <a:rPr lang="bs-Latn-BA" dirty="0" err="1"/>
+              <a:t>Description</a:t>
+            </a:r>
+            <a:r>
+              <a:rPr lang="bs-Latn-BA" dirty="0"/>
+              <a:t>, </a:t>
+            </a:r>
+            <a:r>
+              <a:rPr lang="bs-Latn-BA" dirty="0" err="1"/>
+              <a:t>Discovery</a:t>
+            </a:r>
+            <a:r>
+              <a:rPr lang="bs-Latn-BA" dirty="0"/>
+              <a:t> </a:t>
+            </a:r>
+            <a:r>
+              <a:rPr lang="bs-Latn-BA" dirty="0" err="1"/>
+              <a:t>and</a:t>
+            </a:r>
+            <a:r>
+              <a:rPr lang="bs-Latn-BA" dirty="0"/>
+              <a:t> </a:t>
+            </a:r>
+            <a:r>
+              <a:rPr lang="bs-Latn-BA" dirty="0" err="1"/>
+              <a:t>Integration</a:t>
+            </a:r>
+            <a:r>
+              <a:rPr lang="bs-Latn-BA" dirty="0"/>
+              <a:t>)</a:t>
+            </a:r>
+          </a:p>
+          <a:p>
+            <a:r>
+              <a:rPr lang="bs-Latn-BA" dirty="0"/>
+              <a:t>WSDL (Web Servise </a:t>
+            </a:r>
+            <a:r>
+              <a:rPr lang="bs-Latn-BA" dirty="0" err="1"/>
+              <a:t>Description</a:t>
+            </a:r>
+            <a:r>
+              <a:rPr lang="bs-Latn-BA" dirty="0"/>
+              <a:t> </a:t>
+            </a:r>
+            <a:r>
+              <a:rPr lang="bs-Latn-BA" dirty="0" err="1"/>
+              <a:t>Language</a:t>
+            </a:r>
+            <a:r>
+              <a:rPr lang="bs-Latn-BA" dirty="0"/>
+              <a:t>)</a:t>
+            </a:r>
             <a:endParaRPr lang="en-US" dirty="0"/>
           </a:p>
         </p:txBody>
@@ -5272,7 +5920,7 @@
     </p:spTree>
     <p:extLst>
       <p:ext uri="{BB962C8B-B14F-4D97-AF65-F5344CB8AC3E}">
-        <p14:creationId xmlns:p14="http://schemas.microsoft.com/office/powerpoint/2010/main" val="3335128653"/>
+        <p14:creationId xmlns:p14="http://schemas.microsoft.com/office/powerpoint/2010/main" val="2136947034"/>
       </p:ext>
     </p:extLst>
   </p:cSld>
@@ -5304,6 +5952,210 @@
           <p:cNvPr id="2" name="Title 1">
             <a:extLst>
               <a:ext uri="{FF2B5EF4-FFF2-40B4-BE49-F238E27FC236}">
+                <a16:creationId xmlns:a16="http://schemas.microsoft.com/office/drawing/2014/main" id="{7F86684E-502E-4A7C-902D-396B01C5F0E0}"/>
+              </a:ext>
+            </a:extLst>
+          </p:cNvPr>
+          <p:cNvSpPr>
+            <a:spLocks noGrp="1"/>
+          </p:cNvSpPr>
+          <p:nvPr>
+            <p:ph type="title"/>
+          </p:nvPr>
+        </p:nvSpPr>
+        <p:spPr/>
+        <p:txBody>
+          <a:bodyPr/>
+          <a:lstStyle/>
+          <a:p>
+            <a:r>
+              <a:rPr lang="bs-Latn-BA" dirty="0"/>
+              <a:t>Proširene Web Servis </a:t>
+            </a:r>
+            <a:r>
+              <a:rPr lang="bs-Latn-BA" dirty="0" err="1"/>
+              <a:t>konponente</a:t>
+            </a:r>
+            <a:endParaRPr lang="en-US" dirty="0"/>
+          </a:p>
+        </p:txBody>
+      </p:sp>
+      <p:sp>
+        <p:nvSpPr>
+          <p:cNvPr id="3" name="Content Placeholder 2">
+            <a:extLst>
+              <a:ext uri="{FF2B5EF4-FFF2-40B4-BE49-F238E27FC236}">
+                <a16:creationId xmlns:a16="http://schemas.microsoft.com/office/drawing/2014/main" id="{018F9976-678E-4F32-B35E-8BD951E6933F}"/>
+              </a:ext>
+            </a:extLst>
+          </p:cNvPr>
+          <p:cNvSpPr>
+            <a:spLocks noGrp="1"/>
+          </p:cNvSpPr>
+          <p:nvPr>
+            <p:ph idx="1"/>
+          </p:nvPr>
+        </p:nvSpPr>
+        <p:spPr/>
+        <p:txBody>
+          <a:bodyPr/>
+          <a:lstStyle/>
+          <a:p>
+            <a:r>
+              <a:rPr lang="bs-Latn-BA" b="1" dirty="0"/>
+              <a:t>WS-</a:t>
+            </a:r>
+            <a:r>
+              <a:rPr lang="bs-Latn-BA" b="1" dirty="0" err="1"/>
+              <a:t>Security</a:t>
+            </a:r>
+            <a:r>
+              <a:rPr lang="bs-Latn-BA" dirty="0"/>
+              <a:t> – specifikacija koja definiše enkripciju i digitalne potpise poruka</a:t>
+            </a:r>
+          </a:p>
+          <a:p>
+            <a:r>
+              <a:rPr lang="bs-Latn-BA" b="1" dirty="0"/>
+              <a:t>WS-</a:t>
+            </a:r>
+            <a:r>
+              <a:rPr lang="bs-Latn-BA" b="1" dirty="0" err="1"/>
+              <a:t>Policy</a:t>
+            </a:r>
+            <a:r>
+              <a:rPr lang="bs-Latn-BA" dirty="0"/>
+              <a:t> – specifikacija koja proširuje WS-</a:t>
+            </a:r>
+            <a:r>
+              <a:rPr lang="bs-Latn-BA" dirty="0" err="1"/>
+              <a:t>Security</a:t>
+            </a:r>
+            <a:r>
+              <a:rPr lang="bs-Latn-BA" dirty="0"/>
+              <a:t> specifikaciju sa detaljima ko i na koji način će koristiti servis.</a:t>
+            </a:r>
+          </a:p>
+          <a:p>
+            <a:r>
+              <a:rPr lang="bs-Latn-BA" b="1" dirty="0"/>
+              <a:t>WS-I</a:t>
+            </a:r>
+            <a:r>
+              <a:rPr lang="bs-Latn-BA" dirty="0"/>
+              <a:t> – skup specifikacija za </a:t>
+            </a:r>
+            <a:r>
+              <a:rPr lang="bs-Latn-BA" dirty="0" err="1"/>
+              <a:t>prevazilaženje</a:t>
+            </a:r>
+            <a:r>
+              <a:rPr lang="bs-Latn-BA" dirty="0"/>
+              <a:t> problema u </a:t>
+            </a:r>
+            <a:r>
+              <a:rPr lang="bs-Latn-BA" dirty="0" err="1"/>
+              <a:t>verzioniranju</a:t>
+            </a:r>
+            <a:r>
+              <a:rPr lang="bs-Latn-BA" dirty="0"/>
+              <a:t>, kao i standardne testove za otklanjanje problema.</a:t>
+            </a:r>
+          </a:p>
+          <a:p>
+            <a:r>
+              <a:rPr lang="bs-Latn-BA" dirty="0"/>
+              <a:t> </a:t>
+            </a:r>
+            <a:r>
+              <a:rPr lang="bs-Latn-BA" b="1" dirty="0"/>
+              <a:t>WS-BPEL</a:t>
+            </a:r>
+            <a:r>
+              <a:rPr lang="bs-Latn-BA" dirty="0"/>
+              <a:t> – (</a:t>
+            </a:r>
+            <a:r>
+              <a:rPr lang="bs-Latn-BA" dirty="0" err="1"/>
+              <a:t>business</a:t>
+            </a:r>
+            <a:r>
+              <a:rPr lang="bs-Latn-BA" dirty="0"/>
+              <a:t> </a:t>
+            </a:r>
+            <a:r>
+              <a:rPr lang="bs-Latn-BA" dirty="0" err="1"/>
+              <a:t>Process</a:t>
+            </a:r>
+            <a:r>
+              <a:rPr lang="bs-Latn-BA" dirty="0"/>
+              <a:t> </a:t>
+            </a:r>
+            <a:r>
+              <a:rPr lang="bs-Latn-BA" dirty="0" err="1"/>
+              <a:t>Execution</a:t>
+            </a:r>
+            <a:r>
+              <a:rPr lang="bs-Latn-BA" dirty="0"/>
+              <a:t> </a:t>
+            </a:r>
+            <a:r>
+              <a:rPr lang="bs-Latn-BA" dirty="0" err="1"/>
+              <a:t>Language</a:t>
+            </a:r>
+            <a:r>
+              <a:rPr lang="bs-Latn-BA" dirty="0"/>
+              <a:t>) definiše standardne akcije u </a:t>
+            </a:r>
+            <a:r>
+              <a:rPr lang="bs-Latn-BA" dirty="0" err="1"/>
+              <a:t>business</a:t>
+            </a:r>
+            <a:r>
+              <a:rPr lang="bs-Latn-BA" dirty="0"/>
+              <a:t> procesu korištenjem servisa.  </a:t>
+            </a:r>
+          </a:p>
+          <a:p>
+            <a:endParaRPr lang="en-US" dirty="0"/>
+          </a:p>
+        </p:txBody>
+      </p:sp>
+    </p:spTree>
+    <p:extLst>
+      <p:ext uri="{BB962C8B-B14F-4D97-AF65-F5344CB8AC3E}">
+        <p14:creationId xmlns:p14="http://schemas.microsoft.com/office/powerpoint/2010/main" val="3335128653"/>
+      </p:ext>
+    </p:extLst>
+  </p:cSld>
+  <p:clrMapOvr>
+    <a:masterClrMapping/>
+  </p:clrMapOvr>
+</p:sld>
+</file>
+
+<file path=ppt/slides/slide17.xml><?xml version="1.0" encoding="utf-8"?>
+<p:sld xmlns:a="http://schemas.openxmlformats.org/drawingml/2006/main" xmlns:r="http://schemas.openxmlformats.org/officeDocument/2006/relationships" xmlns:p="http://schemas.openxmlformats.org/presentationml/2006/main">
+  <p:cSld>
+    <p:spTree>
+      <p:nvGrpSpPr>
+        <p:cNvPr id="1" name=""/>
+        <p:cNvGrpSpPr/>
+        <p:nvPr/>
+      </p:nvGrpSpPr>
+      <p:grpSpPr>
+        <a:xfrm>
+          <a:off x="0" y="0"/>
+          <a:ext cx="0" cy="0"/>
+          <a:chOff x="0" y="0"/>
+          <a:chExt cx="0" cy="0"/>
+        </a:xfrm>
+      </p:grpSpPr>
+      <p:sp>
+        <p:nvSpPr>
+          <p:cNvPr id="2" name="Title 1">
+            <a:extLst>
+              <a:ext uri="{FF2B5EF4-FFF2-40B4-BE49-F238E27FC236}">
                 <a16:creationId xmlns:a16="http://schemas.microsoft.com/office/drawing/2014/main" id="{ADE6168C-1024-4679-9157-7E9179CA7734}"/>
               </a:ext>
             </a:extLst>
@@ -5352,8 +6204,8 @@
         </p:blipFill>
         <p:spPr>
           <a:xfrm>
-            <a:off x="2455555" y="1363287"/>
-            <a:ext cx="8563762" cy="4588626"/>
+            <a:off x="1445957" y="1363287"/>
+            <a:ext cx="9573360" cy="5129588"/>
           </a:xfrm>
           <a:prstGeom prst="rect">
             <a:avLst/>
@@ -5373,7 +6225,7 @@
 </p:sld>
 </file>
 
-<file path=ppt/slides/slide17.xml><?xml version="1.0" encoding="utf-8"?>
+<file path=ppt/slides/slide18.xml><?xml version="1.0" encoding="utf-8"?>
 <p:sld xmlns:a="http://schemas.openxmlformats.org/drawingml/2006/main" xmlns:r="http://schemas.openxmlformats.org/officeDocument/2006/relationships" xmlns:p="http://schemas.openxmlformats.org/presentationml/2006/main">
   <p:cSld>
     <p:spTree>
@@ -5531,226 +6383,6 @@
 </p:sld>
 </file>
 
-<file path=ppt/slides/slide18.xml><?xml version="1.0" encoding="utf-8"?>
-<p:sld xmlns:a="http://schemas.openxmlformats.org/drawingml/2006/main" xmlns:r="http://schemas.openxmlformats.org/officeDocument/2006/relationships" xmlns:p="http://schemas.openxmlformats.org/presentationml/2006/main">
-  <p:cSld>
-    <p:spTree>
-      <p:nvGrpSpPr>
-        <p:cNvPr id="1" name=""/>
-        <p:cNvGrpSpPr/>
-        <p:nvPr/>
-      </p:nvGrpSpPr>
-      <p:grpSpPr>
-        <a:xfrm>
-          <a:off x="0" y="0"/>
-          <a:ext cx="0" cy="0"/>
-          <a:chOff x="0" y="0"/>
-          <a:chExt cx="0" cy="0"/>
-        </a:xfrm>
-      </p:grpSpPr>
-      <p:sp>
-        <p:nvSpPr>
-          <p:cNvPr id="2" name="Title 1">
-            <a:extLst>
-              <a:ext uri="{FF2B5EF4-FFF2-40B4-BE49-F238E27FC236}">
-                <a16:creationId xmlns:a16="http://schemas.microsoft.com/office/drawing/2014/main" id="{ADE6168C-1024-4679-9157-7E9179CA7734}"/>
-              </a:ext>
-            </a:extLst>
-          </p:cNvPr>
-          <p:cNvSpPr>
-            <a:spLocks noGrp="1"/>
-          </p:cNvSpPr>
-          <p:nvPr>
-            <p:ph type="title"/>
-          </p:nvPr>
-        </p:nvSpPr>
-        <p:spPr/>
-        <p:txBody>
-          <a:bodyPr/>
-          <a:lstStyle/>
-          <a:p>
-            <a:r>
-              <a:rPr lang="bs-Latn-BA" dirty="0"/>
-              <a:t>SOAP (</a:t>
-            </a:r>
-            <a:r>
-              <a:rPr lang="bs-Latn-BA" dirty="0" err="1"/>
-              <a:t>Simple</a:t>
-            </a:r>
-            <a:r>
-              <a:rPr lang="bs-Latn-BA" dirty="0"/>
-              <a:t> </a:t>
-            </a:r>
-            <a:r>
-              <a:rPr lang="bs-Latn-BA" dirty="0" err="1"/>
-              <a:t>Object</a:t>
-            </a:r>
-            <a:r>
-              <a:rPr lang="bs-Latn-BA" dirty="0"/>
-              <a:t> Access </a:t>
-            </a:r>
-            <a:r>
-              <a:rPr lang="bs-Latn-BA" dirty="0" err="1"/>
-              <a:t>Protocol</a:t>
-            </a:r>
-            <a:r>
-              <a:rPr lang="bs-Latn-BA" dirty="0"/>
-              <a:t>)</a:t>
-            </a:r>
-            <a:endParaRPr lang="en-US" dirty="0"/>
-          </a:p>
-        </p:txBody>
-      </p:sp>
-      <p:sp>
-        <p:nvSpPr>
-          <p:cNvPr id="3" name="Content Placeholder 2">
-            <a:extLst>
-              <a:ext uri="{FF2B5EF4-FFF2-40B4-BE49-F238E27FC236}">
-                <a16:creationId xmlns:a16="http://schemas.microsoft.com/office/drawing/2014/main" id="{4CECA652-4929-42F0-BE42-8B5490023570}"/>
-              </a:ext>
-            </a:extLst>
-          </p:cNvPr>
-          <p:cNvSpPr>
-            <a:spLocks noGrp="1"/>
-          </p:cNvSpPr>
-          <p:nvPr>
-            <p:ph idx="1"/>
-          </p:nvPr>
-        </p:nvSpPr>
-        <p:spPr/>
-        <p:txBody>
-          <a:bodyPr/>
-          <a:lstStyle/>
-          <a:p>
-            <a:r>
-              <a:rPr lang="bs-Latn-BA" dirty="0"/>
-              <a:t>Svaka SOAP poruka mora imati </a:t>
-            </a:r>
-            <a:r>
-              <a:rPr lang="bs-Latn-BA" dirty="0" err="1"/>
-              <a:t>Envelop</a:t>
-            </a:r>
-            <a:r>
-              <a:rPr lang="bs-Latn-BA" dirty="0"/>
-              <a:t> element</a:t>
-            </a:r>
-          </a:p>
-          <a:p>
-            <a:r>
-              <a:rPr lang="bs-Latn-BA" dirty="0"/>
-              <a:t>Svaki </a:t>
-            </a:r>
-            <a:r>
-              <a:rPr lang="bs-Latn-BA" dirty="0" err="1"/>
-              <a:t>Envelop</a:t>
-            </a:r>
-            <a:r>
-              <a:rPr lang="bs-Latn-BA" dirty="0"/>
-              <a:t> element mora sadržavati samo jedan </a:t>
-            </a:r>
-            <a:r>
-              <a:rPr lang="bs-Latn-BA" dirty="0" err="1"/>
-              <a:t>Body</a:t>
-            </a:r>
-            <a:r>
-              <a:rPr lang="bs-Latn-BA" dirty="0"/>
-              <a:t> element</a:t>
-            </a:r>
-          </a:p>
-          <a:p>
-            <a:r>
-              <a:rPr lang="bs-Latn-BA" dirty="0"/>
-              <a:t>Svaki </a:t>
-            </a:r>
-            <a:r>
-              <a:rPr lang="bs-Latn-BA" dirty="0" err="1"/>
-              <a:t>Envelop</a:t>
-            </a:r>
-            <a:r>
-              <a:rPr lang="bs-Latn-BA" dirty="0"/>
-              <a:t> element može imati jedan </a:t>
-            </a:r>
-            <a:r>
-              <a:rPr lang="bs-Latn-BA" dirty="0" err="1"/>
-              <a:t>Header</a:t>
-            </a:r>
-            <a:r>
-              <a:rPr lang="bs-Latn-BA" dirty="0"/>
-              <a:t> element.</a:t>
-            </a:r>
-          </a:p>
-          <a:p>
-            <a:r>
-              <a:rPr lang="bs-Latn-BA" dirty="0" err="1"/>
-              <a:t>Header</a:t>
-            </a:r>
-            <a:r>
-              <a:rPr lang="bs-Latn-BA" dirty="0"/>
-              <a:t> element mora se pojaviti kao prvi element</a:t>
-            </a:r>
-          </a:p>
-          <a:p>
-            <a:r>
-              <a:rPr lang="bs-Latn-BA" dirty="0" err="1"/>
-              <a:t>Envelop</a:t>
-            </a:r>
-            <a:r>
-              <a:rPr lang="bs-Latn-BA" dirty="0"/>
-              <a:t> je definisan sa ENV </a:t>
-            </a:r>
-            <a:r>
-              <a:rPr lang="bs-Latn-BA" dirty="0" err="1"/>
-              <a:t>namspace</a:t>
-            </a:r>
-            <a:r>
-              <a:rPr lang="bs-Latn-BA" dirty="0"/>
-              <a:t> prefiksom i </a:t>
-            </a:r>
-            <a:r>
-              <a:rPr lang="bs-Latn-BA" dirty="0" err="1"/>
-              <a:t>Envelop</a:t>
-            </a:r>
-            <a:r>
-              <a:rPr lang="bs-Latn-BA" dirty="0"/>
-              <a:t> elementom</a:t>
-            </a:r>
-          </a:p>
-          <a:p>
-            <a:r>
-              <a:rPr lang="bs-Latn-BA" dirty="0" err="1"/>
-              <a:t>Encoding</a:t>
-            </a:r>
-            <a:r>
-              <a:rPr lang="bs-Latn-BA" dirty="0"/>
-              <a:t> je određen sa </a:t>
-            </a:r>
-            <a:r>
-              <a:rPr lang="bs-Latn-BA" dirty="0" err="1"/>
-              <a:t>namespace</a:t>
-            </a:r>
-            <a:r>
-              <a:rPr lang="bs-Latn-BA" dirty="0"/>
-              <a:t> atributom</a:t>
-            </a:r>
-          </a:p>
-          <a:p>
-            <a:endParaRPr lang="en-US" dirty="0"/>
-          </a:p>
-        </p:txBody>
-      </p:sp>
-    </p:spTree>
-    <p:extLst>
-      <p:ext uri="{BB962C8B-B14F-4D97-AF65-F5344CB8AC3E}">
-        <p14:creationId xmlns:p14="http://schemas.microsoft.com/office/powerpoint/2010/main" val="2673559899"/>
-      </p:ext>
-    </p:extLst>
-  </p:cSld>
-  <p:clrMapOvr>
-    <a:masterClrMapping/>
-  </p:clrMapOvr>
-</p:sld>
-</file>
-
 <file path=ppt/slides/slide19.xml><?xml version="1.0" encoding="utf-8"?>
 <p:sld xmlns:a="http://schemas.openxmlformats.org/drawingml/2006/main" xmlns:r="http://schemas.openxmlformats.org/officeDocument/2006/relationships" xmlns:p="http://schemas.openxmlformats.org/presentationml/2006/main">
   <p:cSld>
@@ -5773,7 +6405,7 @@
           <p:cNvPr id="2" name="Title 1">
             <a:extLst>
               <a:ext uri="{FF2B5EF4-FFF2-40B4-BE49-F238E27FC236}">
-                <a16:creationId xmlns:a16="http://schemas.microsoft.com/office/drawing/2014/main" id="{6F42E527-5836-4D1B-85AB-AC507818A1FB}"/>
+                <a16:creationId xmlns:a16="http://schemas.microsoft.com/office/drawing/2014/main" id="{ADE6168C-1024-4679-9157-7E9179CA7734}"/>
               </a:ext>
             </a:extLst>
           </p:cNvPr>
@@ -5791,150 +6423,177 @@
           <a:p>
             <a:r>
               <a:rPr lang="bs-Latn-BA" dirty="0"/>
-              <a:t>SOAP Primjeri</a:t>
+              <a:t>SOAP (</a:t>
+            </a:r>
+            <a:r>
+              <a:rPr lang="bs-Latn-BA" dirty="0" err="1"/>
+              <a:t>Simple</a:t>
+            </a:r>
+            <a:r>
+              <a:rPr lang="bs-Latn-BA" dirty="0"/>
+              <a:t> </a:t>
+            </a:r>
+            <a:r>
+              <a:rPr lang="bs-Latn-BA" dirty="0" err="1"/>
+              <a:t>Object</a:t>
+            </a:r>
+            <a:r>
+              <a:rPr lang="bs-Latn-BA" dirty="0"/>
+              <a:t> Access </a:t>
+            </a:r>
+            <a:r>
+              <a:rPr lang="bs-Latn-BA" dirty="0" err="1"/>
+              <a:t>Protocol</a:t>
+            </a:r>
+            <a:r>
+              <a:rPr lang="bs-Latn-BA" dirty="0"/>
+              <a:t>)</a:t>
             </a:r>
             <a:endParaRPr lang="en-US" dirty="0"/>
           </a:p>
         </p:txBody>
       </p:sp>
-      <p:pic>
-        <p:nvPicPr>
-          <p:cNvPr id="5" name="Content Placeholder 4">
-            <a:extLst>
-              <a:ext uri="{FF2B5EF4-FFF2-40B4-BE49-F238E27FC236}">
-                <a16:creationId xmlns:a16="http://schemas.microsoft.com/office/drawing/2014/main" id="{04F2EBF5-BF50-40FB-A940-9458145BCDB4}"/>
-              </a:ext>
-            </a:extLst>
-          </p:cNvPr>
-          <p:cNvPicPr>
-            <a:picLocks noGrp="1" noChangeAspect="1"/>
-          </p:cNvPicPr>
+      <p:sp>
+        <p:nvSpPr>
+          <p:cNvPr id="3" name="Content Placeholder 2">
+            <a:extLst>
+              <a:ext uri="{FF2B5EF4-FFF2-40B4-BE49-F238E27FC236}">
+                <a16:creationId xmlns:a16="http://schemas.microsoft.com/office/drawing/2014/main" id="{4CECA652-4929-42F0-BE42-8B5490023570}"/>
+              </a:ext>
+            </a:extLst>
+          </p:cNvPr>
+          <p:cNvSpPr>
+            <a:spLocks noGrp="1"/>
+          </p:cNvSpPr>
           <p:nvPr>
             <p:ph idx="1"/>
           </p:nvPr>
-        </p:nvPicPr>
-        <p:blipFill>
-          <a:blip r:embed="rId2"/>
-          <a:stretch>
-            <a:fillRect/>
-          </a:stretch>
-        </p:blipFill>
-        <p:spPr>
-          <a:xfrm>
-            <a:off x="685242" y="1926204"/>
-            <a:ext cx="5410757" cy="1889055"/>
-          </a:xfrm>
-          <a:prstGeom prst="rect">
-            <a:avLst/>
-          </a:prstGeom>
-        </p:spPr>
-      </p:pic>
-      <p:pic>
-        <p:nvPicPr>
-          <p:cNvPr id="6" name="Picture 5">
-            <a:extLst>
-              <a:ext uri="{FF2B5EF4-FFF2-40B4-BE49-F238E27FC236}">
-                <a16:creationId xmlns:a16="http://schemas.microsoft.com/office/drawing/2014/main" id="{2177FB6B-7B63-40E5-AC52-6FA51952F06C}"/>
-              </a:ext>
-            </a:extLst>
-          </p:cNvPr>
-          <p:cNvPicPr>
-            <a:picLocks noChangeAspect="1"/>
-          </p:cNvPicPr>
-          <p:nvPr/>
-        </p:nvPicPr>
-        <p:blipFill>
-          <a:blip r:embed="rId3"/>
-          <a:stretch>
-            <a:fillRect/>
-          </a:stretch>
-        </p:blipFill>
-        <p:spPr>
-          <a:xfrm>
-            <a:off x="5899486" y="4267891"/>
-            <a:ext cx="5454314" cy="1889055"/>
-          </a:xfrm>
-          <a:prstGeom prst="rect">
-            <a:avLst/>
-          </a:prstGeom>
-        </p:spPr>
-      </p:pic>
-      <p:sp>
-        <p:nvSpPr>
-          <p:cNvPr id="7" name="TextBox 6">
-            <a:extLst>
-              <a:ext uri="{FF2B5EF4-FFF2-40B4-BE49-F238E27FC236}">
-                <a16:creationId xmlns:a16="http://schemas.microsoft.com/office/drawing/2014/main" id="{C9055A73-7F75-4916-A084-EB626E7C0FE8}"/>
-              </a:ext>
-            </a:extLst>
-          </p:cNvPr>
-          <p:cNvSpPr txBox="1"/>
-          <p:nvPr/>
-        </p:nvSpPr>
-        <p:spPr>
-          <a:xfrm>
-            <a:off x="6807200" y="2367280"/>
-            <a:ext cx="2672080" cy="769441"/>
-          </a:xfrm>
-          <a:prstGeom prst="rect">
-            <a:avLst/>
-          </a:prstGeom>
-          <a:noFill/>
-        </p:spPr>
-        <p:txBody>
-          <a:bodyPr wrap="square" rtlCol="0">
-            <a:spAutoFit/>
-          </a:bodyPr>
+        </p:nvSpPr>
+        <p:spPr/>
+        <p:txBody>
+          <a:bodyPr/>
           <a:lstStyle/>
           <a:p>
             <a:r>
-              <a:rPr lang="bs-Latn-BA" sz="4400" dirty="0" err="1"/>
-              <a:t>Request</a:t>
-            </a:r>
-            <a:endParaRPr lang="en-US" sz="4400" dirty="0"/>
-          </a:p>
-        </p:txBody>
-      </p:sp>
-      <p:sp>
-        <p:nvSpPr>
-          <p:cNvPr id="8" name="TextBox 7">
-            <a:extLst>
-              <a:ext uri="{FF2B5EF4-FFF2-40B4-BE49-F238E27FC236}">
-                <a16:creationId xmlns:a16="http://schemas.microsoft.com/office/drawing/2014/main" id="{75E0F0DF-39B9-4C49-A5F8-0BE78CBD5CE8}"/>
-              </a:ext>
-            </a:extLst>
-          </p:cNvPr>
-          <p:cNvSpPr txBox="1"/>
-          <p:nvPr/>
-        </p:nvSpPr>
-        <p:spPr>
-          <a:xfrm>
-            <a:off x="2054580" y="4714240"/>
-            <a:ext cx="2672080" cy="769441"/>
-          </a:xfrm>
-          <a:prstGeom prst="rect">
-            <a:avLst/>
-          </a:prstGeom>
-          <a:noFill/>
-        </p:spPr>
-        <p:txBody>
-          <a:bodyPr wrap="square" rtlCol="0">
-            <a:spAutoFit/>
-          </a:bodyPr>
-          <a:lstStyle/>
-          <a:p>
-            <a:r>
-              <a:rPr lang="bs-Latn-BA" sz="4400" dirty="0" err="1"/>
-              <a:t>Response</a:t>
-            </a:r>
-            <a:endParaRPr lang="en-US" sz="4400" dirty="0"/>
+              <a:rPr lang="bs-Latn-BA" dirty="0"/>
+              <a:t>Svaka SOAP poruka mora imati </a:t>
+            </a:r>
+            <a:r>
+              <a:rPr lang="bs-Latn-BA" dirty="0" err="1"/>
+              <a:t>Envelop</a:t>
+            </a:r>
+            <a:r>
+              <a:rPr lang="bs-Latn-BA" dirty="0"/>
+              <a:t> element</a:t>
+            </a:r>
+          </a:p>
+          <a:p>
+            <a:r>
+              <a:rPr lang="bs-Latn-BA" dirty="0"/>
+              <a:t>Svaki </a:t>
+            </a:r>
+            <a:r>
+              <a:rPr lang="bs-Latn-BA" dirty="0" err="1"/>
+              <a:t>Envelop</a:t>
+            </a:r>
+            <a:r>
+              <a:rPr lang="bs-Latn-BA" dirty="0"/>
+              <a:t> element mora sadržavati samo jedan </a:t>
+            </a:r>
+            <a:r>
+              <a:rPr lang="bs-Latn-BA" dirty="0" err="1"/>
+              <a:t>Body</a:t>
+            </a:r>
+            <a:r>
+              <a:rPr lang="bs-Latn-BA" dirty="0"/>
+              <a:t> element</a:t>
+            </a:r>
+          </a:p>
+          <a:p>
+            <a:r>
+              <a:rPr lang="bs-Latn-BA" dirty="0"/>
+              <a:t>Svaki </a:t>
+            </a:r>
+            <a:r>
+              <a:rPr lang="bs-Latn-BA" dirty="0" err="1"/>
+              <a:t>Envelop</a:t>
+            </a:r>
+            <a:r>
+              <a:rPr lang="bs-Latn-BA" dirty="0"/>
+              <a:t> element može imati jedan </a:t>
+            </a:r>
+            <a:r>
+              <a:rPr lang="bs-Latn-BA" dirty="0" err="1"/>
+              <a:t>Header</a:t>
+            </a:r>
+            <a:r>
+              <a:rPr lang="bs-Latn-BA" dirty="0"/>
+              <a:t> element.</a:t>
+            </a:r>
+          </a:p>
+          <a:p>
+            <a:r>
+              <a:rPr lang="bs-Latn-BA" dirty="0" err="1"/>
+              <a:t>Header</a:t>
+            </a:r>
+            <a:r>
+              <a:rPr lang="bs-Latn-BA" dirty="0"/>
+              <a:t> element mora se pojaviti kao prvi element</a:t>
+            </a:r>
+          </a:p>
+          <a:p>
+            <a:r>
+              <a:rPr lang="bs-Latn-BA" dirty="0" err="1"/>
+              <a:t>Envelop</a:t>
+            </a:r>
+            <a:r>
+              <a:rPr lang="bs-Latn-BA" dirty="0"/>
+              <a:t> je definisan sa ENV </a:t>
+            </a:r>
+            <a:r>
+              <a:rPr lang="bs-Latn-BA" dirty="0" err="1"/>
+              <a:t>namspace</a:t>
+            </a:r>
+            <a:r>
+              <a:rPr lang="bs-Latn-BA" dirty="0"/>
+              <a:t> prefiksom i </a:t>
+            </a:r>
+            <a:r>
+              <a:rPr lang="bs-Latn-BA" dirty="0" err="1"/>
+              <a:t>Envelop</a:t>
+            </a:r>
+            <a:r>
+              <a:rPr lang="bs-Latn-BA" dirty="0"/>
+              <a:t> elementom</a:t>
+            </a:r>
+          </a:p>
+          <a:p>
+            <a:r>
+              <a:rPr lang="bs-Latn-BA" dirty="0" err="1"/>
+              <a:t>Encoding</a:t>
+            </a:r>
+            <a:r>
+              <a:rPr lang="bs-Latn-BA" dirty="0"/>
+              <a:t> je određen sa </a:t>
+            </a:r>
+            <a:r>
+              <a:rPr lang="bs-Latn-BA" dirty="0" err="1"/>
+              <a:t>namespace</a:t>
+            </a:r>
+            <a:r>
+              <a:rPr lang="bs-Latn-BA" dirty="0"/>
+              <a:t> atributom</a:t>
+            </a:r>
+          </a:p>
+          <a:p>
+            <a:endParaRPr lang="en-US" dirty="0"/>
           </a:p>
         </p:txBody>
       </p:sp>
     </p:spTree>
     <p:extLst>
       <p:ext uri="{BB962C8B-B14F-4D97-AF65-F5344CB8AC3E}">
-        <p14:creationId xmlns:p14="http://schemas.microsoft.com/office/powerpoint/2010/main" val="378208478"/>
+        <p14:creationId xmlns:p14="http://schemas.microsoft.com/office/powerpoint/2010/main" val="2673559899"/>
       </p:ext>
     </p:extLst>
   </p:cSld>
@@ -6127,6 +6786,199 @@
           <p:cNvPr id="2" name="Title 1">
             <a:extLst>
               <a:ext uri="{FF2B5EF4-FFF2-40B4-BE49-F238E27FC236}">
+                <a16:creationId xmlns:a16="http://schemas.microsoft.com/office/drawing/2014/main" id="{6F42E527-5836-4D1B-85AB-AC507818A1FB}"/>
+              </a:ext>
+            </a:extLst>
+          </p:cNvPr>
+          <p:cNvSpPr>
+            <a:spLocks noGrp="1"/>
+          </p:cNvSpPr>
+          <p:nvPr>
+            <p:ph type="title"/>
+          </p:nvPr>
+        </p:nvSpPr>
+        <p:spPr/>
+        <p:txBody>
+          <a:bodyPr/>
+          <a:lstStyle/>
+          <a:p>
+            <a:r>
+              <a:rPr lang="bs-Latn-BA" dirty="0"/>
+              <a:t>SOAP Primjeri</a:t>
+            </a:r>
+            <a:endParaRPr lang="en-US" dirty="0"/>
+          </a:p>
+        </p:txBody>
+      </p:sp>
+      <p:pic>
+        <p:nvPicPr>
+          <p:cNvPr id="5" name="Content Placeholder 4">
+            <a:extLst>
+              <a:ext uri="{FF2B5EF4-FFF2-40B4-BE49-F238E27FC236}">
+                <a16:creationId xmlns:a16="http://schemas.microsoft.com/office/drawing/2014/main" id="{04F2EBF5-BF50-40FB-A940-9458145BCDB4}"/>
+              </a:ext>
+            </a:extLst>
+          </p:cNvPr>
+          <p:cNvPicPr>
+            <a:picLocks noGrp="1" noChangeAspect="1"/>
+          </p:cNvPicPr>
+          <p:nvPr>
+            <p:ph idx="1"/>
+          </p:nvPr>
+        </p:nvPicPr>
+        <p:blipFill>
+          <a:blip r:embed="rId3"/>
+          <a:stretch>
+            <a:fillRect/>
+          </a:stretch>
+        </p:blipFill>
+        <p:spPr>
+          <a:xfrm>
+            <a:off x="685242" y="1926204"/>
+            <a:ext cx="5410757" cy="1889055"/>
+          </a:xfrm>
+          <a:prstGeom prst="rect">
+            <a:avLst/>
+          </a:prstGeom>
+        </p:spPr>
+      </p:pic>
+      <p:pic>
+        <p:nvPicPr>
+          <p:cNvPr id="6" name="Picture 5">
+            <a:extLst>
+              <a:ext uri="{FF2B5EF4-FFF2-40B4-BE49-F238E27FC236}">
+                <a16:creationId xmlns:a16="http://schemas.microsoft.com/office/drawing/2014/main" id="{2177FB6B-7B63-40E5-AC52-6FA51952F06C}"/>
+              </a:ext>
+            </a:extLst>
+          </p:cNvPr>
+          <p:cNvPicPr>
+            <a:picLocks noChangeAspect="1"/>
+          </p:cNvPicPr>
+          <p:nvPr/>
+        </p:nvPicPr>
+        <p:blipFill>
+          <a:blip r:embed="rId4"/>
+          <a:stretch>
+            <a:fillRect/>
+          </a:stretch>
+        </p:blipFill>
+        <p:spPr>
+          <a:xfrm>
+            <a:off x="5899486" y="4267891"/>
+            <a:ext cx="5454314" cy="1889055"/>
+          </a:xfrm>
+          <a:prstGeom prst="rect">
+            <a:avLst/>
+          </a:prstGeom>
+        </p:spPr>
+      </p:pic>
+      <p:sp>
+        <p:nvSpPr>
+          <p:cNvPr id="7" name="TextBox 6">
+            <a:extLst>
+              <a:ext uri="{FF2B5EF4-FFF2-40B4-BE49-F238E27FC236}">
+                <a16:creationId xmlns:a16="http://schemas.microsoft.com/office/drawing/2014/main" id="{C9055A73-7F75-4916-A084-EB626E7C0FE8}"/>
+              </a:ext>
+            </a:extLst>
+          </p:cNvPr>
+          <p:cNvSpPr txBox="1"/>
+          <p:nvPr/>
+        </p:nvSpPr>
+        <p:spPr>
+          <a:xfrm>
+            <a:off x="6807200" y="2367280"/>
+            <a:ext cx="2672080" cy="769441"/>
+          </a:xfrm>
+          <a:prstGeom prst="rect">
+            <a:avLst/>
+          </a:prstGeom>
+          <a:noFill/>
+        </p:spPr>
+        <p:txBody>
+          <a:bodyPr wrap="square" rtlCol="0">
+            <a:spAutoFit/>
+          </a:bodyPr>
+          <a:lstStyle/>
+          <a:p>
+            <a:r>
+              <a:rPr lang="bs-Latn-BA" sz="4400" dirty="0" err="1"/>
+              <a:t>Request</a:t>
+            </a:r>
+            <a:endParaRPr lang="en-US" sz="4400" dirty="0"/>
+          </a:p>
+        </p:txBody>
+      </p:sp>
+      <p:sp>
+        <p:nvSpPr>
+          <p:cNvPr id="8" name="TextBox 7">
+            <a:extLst>
+              <a:ext uri="{FF2B5EF4-FFF2-40B4-BE49-F238E27FC236}">
+                <a16:creationId xmlns:a16="http://schemas.microsoft.com/office/drawing/2014/main" id="{75E0F0DF-39B9-4C49-A5F8-0BE78CBD5CE8}"/>
+              </a:ext>
+            </a:extLst>
+          </p:cNvPr>
+          <p:cNvSpPr txBox="1"/>
+          <p:nvPr/>
+        </p:nvSpPr>
+        <p:spPr>
+          <a:xfrm>
+            <a:off x="2054580" y="4714240"/>
+            <a:ext cx="2672080" cy="769441"/>
+          </a:xfrm>
+          <a:prstGeom prst="rect">
+            <a:avLst/>
+          </a:prstGeom>
+          <a:noFill/>
+        </p:spPr>
+        <p:txBody>
+          <a:bodyPr wrap="square" rtlCol="0">
+            <a:spAutoFit/>
+          </a:bodyPr>
+          <a:lstStyle/>
+          <a:p>
+            <a:r>
+              <a:rPr lang="bs-Latn-BA" sz="4400" dirty="0" err="1"/>
+              <a:t>Response</a:t>
+            </a:r>
+            <a:endParaRPr lang="en-US" sz="4400" dirty="0"/>
+          </a:p>
+        </p:txBody>
+      </p:sp>
+    </p:spTree>
+    <p:extLst>
+      <p:ext uri="{BB962C8B-B14F-4D97-AF65-F5344CB8AC3E}">
+        <p14:creationId xmlns:p14="http://schemas.microsoft.com/office/powerpoint/2010/main" val="378208478"/>
+      </p:ext>
+    </p:extLst>
+  </p:cSld>
+  <p:clrMapOvr>
+    <a:masterClrMapping/>
+  </p:clrMapOvr>
+</p:sld>
+</file>
+
+<file path=ppt/slides/slide21.xml><?xml version="1.0" encoding="utf-8"?>
+<p:sld xmlns:a="http://schemas.openxmlformats.org/drawingml/2006/main" xmlns:r="http://schemas.openxmlformats.org/officeDocument/2006/relationships" xmlns:p="http://schemas.openxmlformats.org/presentationml/2006/main">
+  <p:cSld>
+    <p:spTree>
+      <p:nvGrpSpPr>
+        <p:cNvPr id="1" name=""/>
+        <p:cNvGrpSpPr/>
+        <p:nvPr/>
+      </p:nvGrpSpPr>
+      <p:grpSpPr>
+        <a:xfrm>
+          <a:off x="0" y="0"/>
+          <a:ext cx="0" cy="0"/>
+          <a:chOff x="0" y="0"/>
+          <a:chExt cx="0" cy="0"/>
+        </a:xfrm>
+      </p:grpSpPr>
+      <p:sp>
+        <p:nvSpPr>
+          <p:cNvPr id="2" name="Title 1">
+            <a:extLst>
+              <a:ext uri="{FF2B5EF4-FFF2-40B4-BE49-F238E27FC236}">
                 <a16:creationId xmlns:a16="http://schemas.microsoft.com/office/drawing/2014/main" id="{6A9224B8-D323-4988-90D5-6FE88C1E0974}"/>
               </a:ext>
             </a:extLst>
@@ -6204,7 +7056,7 @@
 </p:sld>
 </file>
 
-<file path=ppt/slides/slide21.xml><?xml version="1.0" encoding="utf-8"?>
+<file path=ppt/slides/slide22.xml><?xml version="1.0" encoding="utf-8"?>
 <p:sld xmlns:a="http://schemas.openxmlformats.org/drawingml/2006/main" xmlns:r="http://schemas.openxmlformats.org/officeDocument/2006/relationships" xmlns:p="http://schemas.openxmlformats.org/presentationml/2006/main">
   <p:cSld>
     <p:spTree>
@@ -6296,7 +7148,7 @@
           <p:nvPr/>
         </p:nvPicPr>
         <p:blipFill>
-          <a:blip r:embed="rId2"/>
+          <a:blip r:embed="rId3"/>
           <a:stretch>
             <a:fillRect/>
           </a:stretch>
@@ -6324,7 +7176,7 @@
 </p:sld>
 </file>
 
-<file path=ppt/slides/slide22.xml><?xml version="1.0" encoding="utf-8"?>
+<file path=ppt/slides/slide23.xml><?xml version="1.0" encoding="utf-8"?>
 <p:sld xmlns:a="http://schemas.openxmlformats.org/drawingml/2006/main" xmlns:r="http://schemas.openxmlformats.org/officeDocument/2006/relationships" xmlns:p="http://schemas.openxmlformats.org/presentationml/2006/main">
   <p:cSld>
     <p:spTree>
@@ -6465,7 +7317,7 @@
 </p:sld>
 </file>
 
-<file path=ppt/slides/slide23.xml><?xml version="1.0" encoding="utf-8"?>
+<file path=ppt/slides/slide24.xml><?xml version="1.0" encoding="utf-8"?>
 <p:sld xmlns:a="http://schemas.openxmlformats.org/drawingml/2006/main" xmlns:r="http://schemas.openxmlformats.org/officeDocument/2006/relationships" xmlns:p="http://schemas.openxmlformats.org/presentationml/2006/main">
   <p:cSld>
     <p:spTree>
@@ -9330,7 +10182,7 @@
           <p:cNvPr id="2" name="Title 1">
             <a:extLst>
               <a:ext uri="{FF2B5EF4-FFF2-40B4-BE49-F238E27FC236}">
-                <a16:creationId xmlns:a16="http://schemas.microsoft.com/office/drawing/2014/main" id="{E51A41ED-7929-4783-AF94-16A1B7EA3551}"/>
+                <a16:creationId xmlns:a16="http://schemas.microsoft.com/office/drawing/2014/main" id="{A41F8C5D-2B6A-4C12-869A-542BD3B3DBB7}"/>
               </a:ext>
             </a:extLst>
           </p:cNvPr>
@@ -9341,167 +10193,20 @@
             <p:ph type="title"/>
           </p:nvPr>
         </p:nvSpPr>
-        <p:spPr/>
+        <p:spPr>
+          <a:xfrm>
+            <a:off x="897194" y="2896932"/>
+            <a:ext cx="10515600" cy="1325563"/>
+          </a:xfrm>
+        </p:spPr>
         <p:txBody>
           <a:bodyPr/>
           <a:lstStyle/>
           <a:p>
-            <a:r>
-              <a:rPr lang="bs-Latn-BA" dirty="0"/>
-              <a:t>Historija Web </a:t>
-            </a:r>
-            <a:r>
-              <a:rPr lang="bs-Latn-BA" dirty="0" err="1"/>
-              <a:t>Serivsa</a:t>
-            </a:r>
-            <a:endParaRPr lang="en-US" dirty="0"/>
-          </a:p>
-        </p:txBody>
-      </p:sp>
-      <p:sp>
-        <p:nvSpPr>
-          <p:cNvPr id="3" name="Content Placeholder 2">
-            <a:extLst>
-              <a:ext uri="{FF2B5EF4-FFF2-40B4-BE49-F238E27FC236}">
-                <a16:creationId xmlns:a16="http://schemas.microsoft.com/office/drawing/2014/main" id="{A9A88391-87EC-4C5C-93AA-D915074AFEDC}"/>
-              </a:ext>
-            </a:extLst>
-          </p:cNvPr>
-          <p:cNvSpPr>
-            <a:spLocks noGrp="1"/>
-          </p:cNvSpPr>
-          <p:nvPr>
-            <p:ph idx="1"/>
-          </p:nvPr>
-        </p:nvSpPr>
-        <p:spPr/>
-        <p:txBody>
-          <a:bodyPr/>
-          <a:lstStyle/>
-          <a:p>
-            <a:r>
-              <a:rPr lang="bs-Latn-BA" dirty="0"/>
-              <a:t>1975 EDI (</a:t>
-            </a:r>
-            <a:r>
-              <a:rPr lang="en-US" dirty="0"/>
-              <a:t>Electronic </a:t>
-            </a:r>
-            <a:r>
-              <a:rPr lang="bs-Latn-BA" dirty="0"/>
-              <a:t>D</a:t>
-            </a:r>
-            <a:r>
-              <a:rPr lang="en-US" dirty="0" err="1"/>
-              <a:t>ata</a:t>
-            </a:r>
-            <a:r>
-              <a:rPr lang="en-US" dirty="0"/>
-              <a:t> </a:t>
-            </a:r>
-            <a:r>
-              <a:rPr lang="bs-Latn-BA" dirty="0"/>
-              <a:t>I</a:t>
-            </a:r>
-            <a:r>
-              <a:rPr lang="en-US" dirty="0" err="1"/>
-              <a:t>nterchange</a:t>
-            </a:r>
-            <a:r>
-              <a:rPr lang="bs-Latn-BA" dirty="0"/>
-              <a:t>) prvi pokušaj da se uspostavi komunikacija između dvije udaljene aplikacije</a:t>
-            </a:r>
-          </a:p>
-          <a:p>
-            <a:r>
-              <a:rPr lang="bs-Latn-BA" dirty="0"/>
-              <a:t>1994 </a:t>
-            </a:r>
-            <a:r>
-              <a:rPr lang="bs-Latn-BA" dirty="0" err="1"/>
-              <a:t>početak</a:t>
-            </a:r>
-            <a:r>
-              <a:rPr lang="bs-Latn-BA" dirty="0"/>
-              <a:t> masovne upotrebe interneta</a:t>
-            </a:r>
-          </a:p>
-          <a:p>
-            <a:r>
-              <a:rPr lang="bs-Latn-BA" dirty="0"/>
-              <a:t>1997 HTTP postaje standard</a:t>
-            </a:r>
-          </a:p>
-          <a:p>
-            <a:r>
-              <a:rPr lang="bs-Latn-BA" dirty="0"/>
-              <a:t>1998 XML 1.0</a:t>
-            </a:r>
-          </a:p>
-          <a:p>
-            <a:r>
-              <a:rPr lang="bs-Latn-BA" dirty="0"/>
-              <a:t>1999 Microsoft prezentira SOAP 1.0 </a:t>
-            </a:r>
-          </a:p>
-          <a:p>
-            <a:r>
-              <a:rPr lang="bs-Latn-BA" dirty="0"/>
-              <a:t>2000 MS, IBM i </a:t>
-            </a:r>
-            <a:r>
-              <a:rPr lang="bs-Latn-BA" dirty="0" err="1"/>
-              <a:t>Ariba</a:t>
-            </a:r>
-            <a:r>
-              <a:rPr lang="bs-Latn-BA" dirty="0"/>
-              <a:t> rade na UDDI (</a:t>
-            </a:r>
-            <a:r>
-              <a:rPr lang="bs-Latn-BA" dirty="0" err="1"/>
-              <a:t>Univesal</a:t>
-            </a:r>
-            <a:r>
-              <a:rPr lang="bs-Latn-BA" dirty="0"/>
-              <a:t> </a:t>
-            </a:r>
-            <a:r>
-              <a:rPr lang="bs-Latn-BA" dirty="0" err="1"/>
-              <a:t>Description</a:t>
-            </a:r>
-            <a:r>
-              <a:rPr lang="bs-Latn-BA" dirty="0"/>
-              <a:t> </a:t>
-            </a:r>
-            <a:r>
-              <a:rPr lang="bs-Latn-BA" dirty="0" err="1"/>
-              <a:t>Discovery</a:t>
-            </a:r>
-            <a:r>
-              <a:rPr lang="bs-Latn-BA" dirty="0"/>
-              <a:t> </a:t>
-            </a:r>
-            <a:r>
-              <a:rPr lang="bs-Latn-BA" dirty="0" err="1"/>
-              <a:t>and</a:t>
-            </a:r>
-            <a:r>
-              <a:rPr lang="bs-Latn-BA" dirty="0"/>
-              <a:t> </a:t>
-            </a:r>
-            <a:r>
-              <a:rPr lang="bs-Latn-BA" dirty="0" err="1"/>
-              <a:t>Integration</a:t>
-            </a:r>
-            <a:r>
-              <a:rPr lang="bs-Latn-BA" dirty="0"/>
-              <a:t>)</a:t>
-            </a:r>
-          </a:p>
-          <a:p>
-            <a:r>
-              <a:rPr lang="bs-Latn-BA" dirty="0"/>
-              <a:t>2000 SOAP + UDDI + WSDL = Web Service</a:t>
+            <a:pPr algn="ctr"/>
+            <a:r>
+              <a:rPr lang="bs-Latn-BA" dirty="0"/>
+              <a:t>Web Servisi</a:t>
             </a:r>
             <a:endParaRPr lang="en-US" dirty="0"/>
           </a:p>
@@ -9510,7 +10215,7 @@
     </p:spTree>
     <p:extLst>
       <p:ext uri="{BB962C8B-B14F-4D97-AF65-F5344CB8AC3E}">
-        <p14:creationId xmlns:p14="http://schemas.microsoft.com/office/powerpoint/2010/main" val="423195653"/>
+        <p14:creationId xmlns:p14="http://schemas.microsoft.com/office/powerpoint/2010/main" val="2673170372"/>
       </p:ext>
     </p:extLst>
   </p:cSld>
@@ -9542,7 +10247,7 @@
           <p:cNvPr id="2" name="Title 1">
             <a:extLst>
               <a:ext uri="{FF2B5EF4-FFF2-40B4-BE49-F238E27FC236}">
-                <a16:creationId xmlns:a16="http://schemas.microsoft.com/office/drawing/2014/main" id="{ADE6168C-1024-4679-9157-7E9179CA7734}"/>
+                <a16:creationId xmlns:a16="http://schemas.microsoft.com/office/drawing/2014/main" id="{E51A41ED-7929-4783-AF94-16A1B7EA3551}"/>
               </a:ext>
             </a:extLst>
           </p:cNvPr>
@@ -9560,7 +10265,11 @@
           <a:p>
             <a:r>
               <a:rPr lang="bs-Latn-BA" dirty="0"/>
-              <a:t>Osnovni pojmovi </a:t>
+              <a:t>Historija Web </a:t>
+            </a:r>
+            <a:r>
+              <a:rPr lang="bs-Latn-BA" dirty="0" err="1"/>
+              <a:t>Serivsa</a:t>
             </a:r>
             <a:endParaRPr lang="en-US" dirty="0"/>
           </a:p>
@@ -9571,7 +10280,7 @@
           <p:cNvPr id="3" name="Content Placeholder 2">
             <a:extLst>
               <a:ext uri="{FF2B5EF4-FFF2-40B4-BE49-F238E27FC236}">
-                <a16:creationId xmlns:a16="http://schemas.microsoft.com/office/drawing/2014/main" id="{4CECA652-4929-42F0-BE42-8B5490023570}"/>
+                <a16:creationId xmlns:a16="http://schemas.microsoft.com/office/drawing/2014/main" id="{A9A88391-87EC-4C5C-93AA-D915074AFEDC}"/>
               </a:ext>
             </a:extLst>
           </p:cNvPr>
@@ -9584,63 +10293,90 @@
         </p:nvSpPr>
         <p:spPr/>
         <p:txBody>
-          <a:bodyPr>
-            <a:normAutofit lnSpcReduction="10000"/>
-          </a:bodyPr>
+          <a:bodyPr/>
           <a:lstStyle/>
           <a:p>
             <a:r>
               <a:rPr lang="bs-Latn-BA" dirty="0"/>
-              <a:t>Web Servisi</a:t>
-            </a:r>
-          </a:p>
-          <a:p>
-            <a:pPr lvl="1"/>
-            <a:r>
-              <a:rPr lang="bs-Latn-BA" dirty="0"/>
-              <a:t>XML</a:t>
-            </a:r>
-          </a:p>
-          <a:p>
-            <a:r>
-              <a:rPr lang="bs-Latn-BA" dirty="0"/>
-              <a:t>Web API</a:t>
-            </a:r>
-          </a:p>
-          <a:p>
-            <a:pPr lvl="1"/>
-            <a:r>
-              <a:rPr lang="bs-Latn-BA" dirty="0"/>
-              <a:t>JSON</a:t>
-            </a:r>
-          </a:p>
-          <a:p>
-            <a:pPr lvl="1"/>
-            <a:endParaRPr lang="bs-Latn-BA" dirty="0"/>
-          </a:p>
-          <a:p>
-            <a:r>
-              <a:rPr lang="bs-Latn-BA" dirty="0"/>
-              <a:t>SOAP </a:t>
+              <a:t>1975 EDI (</a:t>
+            </a:r>
+            <a:r>
+              <a:rPr lang="en-US" dirty="0"/>
+              <a:t>Electronic </a:t>
+            </a:r>
+            <a:r>
+              <a:rPr lang="bs-Latn-BA" dirty="0"/>
+              <a:t>D</a:t>
+            </a:r>
+            <a:r>
+              <a:rPr lang="en-US" dirty="0" err="1"/>
+              <a:t>ata</a:t>
+            </a:r>
+            <a:r>
+              <a:rPr lang="en-US" dirty="0"/>
+              <a:t> </a:t>
+            </a:r>
+            <a:r>
+              <a:rPr lang="bs-Latn-BA" dirty="0"/>
+              <a:t>I</a:t>
+            </a:r>
+            <a:r>
+              <a:rPr lang="en-US" dirty="0" err="1"/>
+              <a:t>nterchange</a:t>
+            </a:r>
+            <a:r>
+              <a:rPr lang="bs-Latn-BA" dirty="0"/>
+              <a:t>) prvi pokušaj da se uspostavi komunikacija između dvije udaljene aplikacije</a:t>
+            </a:r>
+          </a:p>
+          <a:p>
+            <a:r>
+              <a:rPr lang="bs-Latn-BA" dirty="0"/>
+              <a:t>1994 </a:t>
             </a:r>
             <a:r>
               <a:rPr lang="bs-Latn-BA" dirty="0" err="1"/>
-              <a:t>vs</a:t>
-            </a:r>
-            <a:r>
-              <a:rPr lang="bs-Latn-BA" dirty="0"/>
-              <a:t>. REST servisi</a:t>
-            </a:r>
-          </a:p>
-          <a:p>
-            <a:pPr lvl="1"/>
-            <a:r>
-              <a:rPr lang="bs-Latn-BA" dirty="0"/>
-              <a:t>Web servisi bazirani na SOAP protokolu (</a:t>
+              <a:t>početak</a:t>
+            </a:r>
+            <a:r>
+              <a:rPr lang="bs-Latn-BA" dirty="0"/>
+              <a:t> masovne upotrebe interneta</a:t>
+            </a:r>
+          </a:p>
+          <a:p>
+            <a:r>
+              <a:rPr lang="bs-Latn-BA" dirty="0"/>
+              <a:t>1997 HTTP postaje standard</a:t>
+            </a:r>
+          </a:p>
+          <a:p>
+            <a:r>
+              <a:rPr lang="bs-Latn-BA" dirty="0"/>
+              <a:t>1998 XML 1.0</a:t>
+            </a:r>
+          </a:p>
+          <a:p>
+            <a:r>
+              <a:rPr lang="bs-Latn-BA" dirty="0"/>
+              <a:t>1999 Microsoft prezentira SOAP 1.0 </a:t>
+            </a:r>
+          </a:p>
+          <a:p>
+            <a:r>
+              <a:rPr lang="bs-Latn-BA" dirty="0"/>
+              <a:t>2000 MS, IBM i </a:t>
             </a:r>
             <a:r>
               <a:rPr lang="bs-Latn-BA" dirty="0" err="1"/>
-              <a:t>Simple</a:t>
+              <a:t>Ariba</a:t>
+            </a:r>
+            <a:r>
+              <a:rPr lang="bs-Latn-BA" dirty="0"/>
+              <a:t> rade na UDDI (</a:t>
+            </a:r>
+            <a:r>
+              <a:rPr lang="bs-Latn-BA" dirty="0" err="1"/>
+              <a:t>Univesal</a:t>
             </a:r>
             <a:r>
               <a:rPr lang="bs-Latn-BA" dirty="0"/>
@@ -9648,42 +10384,41 @@
             </a:r>
             <a:r>
               <a:rPr lang="bs-Latn-BA" dirty="0" err="1"/>
-              <a:t>Object</a:t>
-            </a:r>
-            <a:r>
-              <a:rPr lang="bs-Latn-BA" dirty="0"/>
-              <a:t> Access </a:t>
+              <a:t>Description</a:t>
+            </a:r>
+            <a:r>
+              <a:rPr lang="bs-Latn-BA" dirty="0"/>
+              <a:t> </a:t>
             </a:r>
             <a:r>
               <a:rPr lang="bs-Latn-BA" dirty="0" err="1"/>
-              <a:t>Protocol</a:t>
-            </a:r>
-            <a:r>
-              <a:rPr lang="bs-Latn-BA" dirty="0"/>
-              <a:t>). Predstavlja XML-bazirani protokol za pristup web servisima.</a:t>
-            </a:r>
-          </a:p>
-          <a:p>
-            <a:pPr lvl="1"/>
-            <a:r>
-              <a:rPr lang="bs-Latn-BA" dirty="0"/>
-              <a:t>Web servisi bazirani na REST protokolu (</a:t>
+              <a:t>Discovery</a:t>
+            </a:r>
+            <a:r>
+              <a:rPr lang="bs-Latn-BA" dirty="0"/>
+              <a:t> </a:t>
             </a:r>
             <a:r>
               <a:rPr lang="bs-Latn-BA" dirty="0" err="1"/>
-              <a:t>Representational</a:t>
-            </a:r>
-            <a:r>
-              <a:rPr lang="bs-Latn-BA" dirty="0"/>
-              <a:t> State Transfer ) Predstavlja web servis baziran na skupu ograničenja u odnosu na prethodni na definisanje web servisa. </a:t>
+              <a:t>and</a:t>
+            </a:r>
+            <a:r>
+              <a:rPr lang="bs-Latn-BA" dirty="0"/>
+              <a:t> </a:t>
             </a:r>
             <a:r>
               <a:rPr lang="bs-Latn-BA" dirty="0" err="1"/>
-              <a:t>Omogućava</a:t>
-            </a:r>
-            <a:r>
-              <a:rPr lang="bs-Latn-BA" dirty="0"/>
-              <a:t> širi spektar klijenata koji ga mogu koristiti.  </a:t>
+              <a:t>Integration</a:t>
+            </a:r>
+            <a:r>
+              <a:rPr lang="bs-Latn-BA" dirty="0"/>
+              <a:t>)</a:t>
+            </a:r>
+          </a:p>
+          <a:p>
+            <a:r>
+              <a:rPr lang="bs-Latn-BA" dirty="0"/>
+              <a:t>2000 SOAP + UDDI + WSDL = Web Service</a:t>
             </a:r>
             <a:endParaRPr lang="en-US" dirty="0"/>
           </a:p>
@@ -9692,7 +10427,7 @@
     </p:spTree>
     <p:extLst>
       <p:ext uri="{BB962C8B-B14F-4D97-AF65-F5344CB8AC3E}">
-        <p14:creationId xmlns:p14="http://schemas.microsoft.com/office/powerpoint/2010/main" val="2673011417"/>
+        <p14:creationId xmlns:p14="http://schemas.microsoft.com/office/powerpoint/2010/main" val="423195653"/>
       </p:ext>
     </p:extLst>
   </p:cSld>

</xml_diff>